<commit_message>
Trying to get info modals to work again. Still an issue where checks have extra conditions depending on log type
</commit_message>
<xml_diff>
--- a/QA log app - behind the code.pptx
+++ b/QA log app - behind the code.pptx
@@ -124,7 +124,7 @@
 <p1510:revInfo xmlns:a="http://schemas.openxmlformats.org/drawingml/2006/main" xmlns:r="http://schemas.openxmlformats.org/officeDocument/2006/relationships" xmlns:p1510="http://schemas.microsoft.com/office/powerpoint/2015/10/main">
   <p1510:revLst>
     <p1510:client id="{21694504-DF36-4190-984B-87BF7BD1C818}" v="87" dt="2021-10-25T14:06:36.756"/>
-    <p1510:client id="{E34FB9E7-6CF7-40FD-83B9-B94EF404FC33}" v="14" dt="2021-10-25T15:27:17.299"/>
+    <p1510:client id="{E34FB9E7-6CF7-40FD-83B9-B94EF404FC33}" v="33" dt="2021-10-26T08:00:26.881"/>
   </p1510:revLst>
 </p1510:revInfo>
 </file>
@@ -134,7 +134,7 @@
   <pc:docChgLst>
     <pc:chgData name="MORLEY, Thomas" userId="ca0a1631-feee-46f8-9dc6-a0f397eff84f" providerId="ADAL" clId="{E34FB9E7-6CF7-40FD-83B9-B94EF404FC33}"/>
     <pc:docChg chg="custSel addSld delSld modSld">
-      <pc:chgData name="MORLEY, Thomas" userId="ca0a1631-feee-46f8-9dc6-a0f397eff84f" providerId="ADAL" clId="{E34FB9E7-6CF7-40FD-83B9-B94EF404FC33}" dt="2021-10-25T15:38:38.255" v="959" actId="20577"/>
+      <pc:chgData name="MORLEY, Thomas" userId="ca0a1631-feee-46f8-9dc6-a0f397eff84f" providerId="ADAL" clId="{E34FB9E7-6CF7-40FD-83B9-B94EF404FC33}" dt="2021-10-26T08:01:03.629" v="2546" actId="20577"/>
       <pc:docMkLst>
         <pc:docMk/>
       </pc:docMkLst>
@@ -374,8 +374,8 @@
           </ac:spMkLst>
         </pc:spChg>
       </pc:sldChg>
-      <pc:sldChg chg="modSp new mod">
-        <pc:chgData name="MORLEY, Thomas" userId="ca0a1631-feee-46f8-9dc6-a0f397eff84f" providerId="ADAL" clId="{E34FB9E7-6CF7-40FD-83B9-B94EF404FC33}" dt="2021-10-25T15:38:38.255" v="959" actId="20577"/>
+      <pc:sldChg chg="addSp modSp new mod">
+        <pc:chgData name="MORLEY, Thomas" userId="ca0a1631-feee-46f8-9dc6-a0f397eff84f" providerId="ADAL" clId="{E34FB9E7-6CF7-40FD-83B9-B94EF404FC33}" dt="2021-10-26T08:01:03.629" v="2546" actId="20577"/>
         <pc:sldMkLst>
           <pc:docMk/>
           <pc:sldMk cId="342339206" sldId="265"/>
@@ -388,6 +388,94 @@
             <ac:spMk id="2" creationId="{CC82E959-E6CC-47F7-BA52-A438C7605CA7}"/>
           </ac:spMkLst>
         </pc:spChg>
+        <pc:spChg chg="mod">
+          <ac:chgData name="MORLEY, Thomas" userId="ca0a1631-feee-46f8-9dc6-a0f397eff84f" providerId="ADAL" clId="{E34FB9E7-6CF7-40FD-83B9-B94EF404FC33}" dt="2021-10-26T07:58:59.815" v="2267" actId="20577"/>
+          <ac:spMkLst>
+            <pc:docMk/>
+            <pc:sldMk cId="342339206" sldId="265"/>
+            <ac:spMk id="3" creationId="{781A2963-6C1E-4653-8059-89BAA213C6A8}"/>
+          </ac:spMkLst>
+        </pc:spChg>
+        <pc:spChg chg="add mod">
+          <ac:chgData name="MORLEY, Thomas" userId="ca0a1631-feee-46f8-9dc6-a0f397eff84f" providerId="ADAL" clId="{E34FB9E7-6CF7-40FD-83B9-B94EF404FC33}" dt="2021-10-26T07:46:45.746" v="1768" actId="404"/>
+          <ac:spMkLst>
+            <pc:docMk/>
+            <pc:sldMk cId="342339206" sldId="265"/>
+            <ac:spMk id="4" creationId="{39D4075E-9B29-4E22-BA6C-DA3BD9D0C6AA}"/>
+          </ac:spMkLst>
+        </pc:spChg>
+        <pc:spChg chg="add mod">
+          <ac:chgData name="MORLEY, Thomas" userId="ca0a1631-feee-46f8-9dc6-a0f397eff84f" providerId="ADAL" clId="{E34FB9E7-6CF7-40FD-83B9-B94EF404FC33}" dt="2021-10-26T07:47:32.640" v="1819" actId="1076"/>
+          <ac:spMkLst>
+            <pc:docMk/>
+            <pc:sldMk cId="342339206" sldId="265"/>
+            <ac:spMk id="6" creationId="{E971134A-952A-47AE-9281-909EBB7A6922}"/>
+          </ac:spMkLst>
+        </pc:spChg>
+        <pc:spChg chg="add mod">
+          <ac:chgData name="MORLEY, Thomas" userId="ca0a1631-feee-46f8-9dc6-a0f397eff84f" providerId="ADAL" clId="{E34FB9E7-6CF7-40FD-83B9-B94EF404FC33}" dt="2021-10-26T07:48:10.380" v="1915" actId="1076"/>
+          <ac:spMkLst>
+            <pc:docMk/>
+            <pc:sldMk cId="342339206" sldId="265"/>
+            <ac:spMk id="7" creationId="{53E68661-A9D7-440F-930B-F083407722A6}"/>
+          </ac:spMkLst>
+        </pc:spChg>
+        <pc:spChg chg="add mod">
+          <ac:chgData name="MORLEY, Thomas" userId="ca0a1631-feee-46f8-9dc6-a0f397eff84f" providerId="ADAL" clId="{E34FB9E7-6CF7-40FD-83B9-B94EF404FC33}" dt="2021-10-26T07:58:22.676" v="2179" actId="20577"/>
+          <ac:spMkLst>
+            <pc:docMk/>
+            <pc:sldMk cId="342339206" sldId="265"/>
+            <ac:spMk id="13" creationId="{FD835AAF-E2BA-4373-9EE6-5209ADF8FF15}"/>
+          </ac:spMkLst>
+        </pc:spChg>
+        <pc:spChg chg="add mod">
+          <ac:chgData name="MORLEY, Thomas" userId="ca0a1631-feee-46f8-9dc6-a0f397eff84f" providerId="ADAL" clId="{E34FB9E7-6CF7-40FD-83B9-B94EF404FC33}" dt="2021-10-26T08:01:03.629" v="2546" actId="20577"/>
+          <ac:spMkLst>
+            <pc:docMk/>
+            <pc:sldMk cId="342339206" sldId="265"/>
+            <ac:spMk id="14" creationId="{7554888D-BC3B-47D5-A119-2EA8DE05AA0F}"/>
+          </ac:spMkLst>
+        </pc:spChg>
+        <pc:spChg chg="add mod">
+          <ac:chgData name="MORLEY, Thomas" userId="ca0a1631-feee-46f8-9dc6-a0f397eff84f" providerId="ADAL" clId="{E34FB9E7-6CF7-40FD-83B9-B94EF404FC33}" dt="2021-10-26T08:00:25.719" v="2455" actId="1076"/>
+          <ac:spMkLst>
+            <pc:docMk/>
+            <pc:sldMk cId="342339206" sldId="265"/>
+            <ac:spMk id="15" creationId="{1B4D1569-2450-45CD-BAFC-ED44CEB55C8C}"/>
+          </ac:spMkLst>
+        </pc:spChg>
+        <pc:spChg chg="add mod">
+          <ac:chgData name="MORLEY, Thomas" userId="ca0a1631-feee-46f8-9dc6-a0f397eff84f" providerId="ADAL" clId="{E34FB9E7-6CF7-40FD-83B9-B94EF404FC33}" dt="2021-10-26T08:00:43.999" v="2516" actId="20577"/>
+          <ac:spMkLst>
+            <pc:docMk/>
+            <pc:sldMk cId="342339206" sldId="265"/>
+            <ac:spMk id="16" creationId="{DB16DD6B-7F3D-4EAE-8463-2A03B4FE6A0F}"/>
+          </ac:spMkLst>
+        </pc:spChg>
+        <pc:graphicFrameChg chg="add mod modGraphic">
+          <ac:chgData name="MORLEY, Thomas" userId="ca0a1631-feee-46f8-9dc6-a0f397eff84f" providerId="ADAL" clId="{E34FB9E7-6CF7-40FD-83B9-B94EF404FC33}" dt="2021-10-26T07:46:38.506" v="1765" actId="14100"/>
+          <ac:graphicFrameMkLst>
+            <pc:docMk/>
+            <pc:sldMk cId="342339206" sldId="265"/>
+            <ac:graphicFrameMk id="5" creationId="{89CF16A1-966E-4D4F-802C-1734BAC5BB27}"/>
+          </ac:graphicFrameMkLst>
+        </pc:graphicFrameChg>
+        <pc:cxnChg chg="add mod">
+          <ac:chgData name="MORLEY, Thomas" userId="ca0a1631-feee-46f8-9dc6-a0f397eff84f" providerId="ADAL" clId="{E34FB9E7-6CF7-40FD-83B9-B94EF404FC33}" dt="2021-10-26T07:48:36.064" v="1922" actId="14100"/>
+          <ac:cxnSpMkLst>
+            <pc:docMk/>
+            <pc:sldMk cId="342339206" sldId="265"/>
+            <ac:cxnSpMk id="9" creationId="{2AEE66B2-599C-4D36-AC5F-01F1AC2523F2}"/>
+          </ac:cxnSpMkLst>
+        </pc:cxnChg>
+        <pc:cxnChg chg="add mod">
+          <ac:chgData name="MORLEY, Thomas" userId="ca0a1631-feee-46f8-9dc6-a0f397eff84f" providerId="ADAL" clId="{E34FB9E7-6CF7-40FD-83B9-B94EF404FC33}" dt="2021-10-26T07:48:30.444" v="1921" actId="14100"/>
+          <ac:cxnSpMkLst>
+            <pc:docMk/>
+            <pc:sldMk cId="342339206" sldId="265"/>
+            <ac:cxnSpMk id="10" creationId="{18958671-7DD6-48A5-9F0A-FA367BD106E0}"/>
+          </ac:cxnSpMkLst>
+        </pc:cxnChg>
       </pc:sldChg>
     </pc:docChg>
   </pc:docChgLst>
@@ -1454,7 +1542,7 @@
           <a:p>
             <a:fld id="{565E3272-2692-4CBA-BB89-AE4B7AF62778}" type="datetimeFigureOut">
               <a:rPr lang="en-GB" smtClean="0"/>
-              <a:t>25/10/2021</a:t>
+              <a:t>26/10/2021</a:t>
             </a:fld>
             <a:endParaRPr lang="en-GB"/>
           </a:p>
@@ -1654,7 +1742,7 @@
           <a:p>
             <a:fld id="{565E3272-2692-4CBA-BB89-AE4B7AF62778}" type="datetimeFigureOut">
               <a:rPr lang="en-GB" smtClean="0"/>
-              <a:t>25/10/2021</a:t>
+              <a:t>26/10/2021</a:t>
             </a:fld>
             <a:endParaRPr lang="en-GB"/>
           </a:p>
@@ -1864,7 +1952,7 @@
           <a:p>
             <a:fld id="{565E3272-2692-4CBA-BB89-AE4B7AF62778}" type="datetimeFigureOut">
               <a:rPr lang="en-GB" smtClean="0"/>
-              <a:t>25/10/2021</a:t>
+              <a:t>26/10/2021</a:t>
             </a:fld>
             <a:endParaRPr lang="en-GB"/>
           </a:p>
@@ -2064,7 +2152,7 @@
           <a:p>
             <a:fld id="{565E3272-2692-4CBA-BB89-AE4B7AF62778}" type="datetimeFigureOut">
               <a:rPr lang="en-GB" smtClean="0"/>
-              <a:t>25/10/2021</a:t>
+              <a:t>26/10/2021</a:t>
             </a:fld>
             <a:endParaRPr lang="en-GB"/>
           </a:p>
@@ -2340,7 +2428,7 @@
           <a:p>
             <a:fld id="{565E3272-2692-4CBA-BB89-AE4B7AF62778}" type="datetimeFigureOut">
               <a:rPr lang="en-GB" smtClean="0"/>
-              <a:t>25/10/2021</a:t>
+              <a:t>26/10/2021</a:t>
             </a:fld>
             <a:endParaRPr lang="en-GB"/>
           </a:p>
@@ -2608,7 +2696,7 @@
           <a:p>
             <a:fld id="{565E3272-2692-4CBA-BB89-AE4B7AF62778}" type="datetimeFigureOut">
               <a:rPr lang="en-GB" smtClean="0"/>
-              <a:t>25/10/2021</a:t>
+              <a:t>26/10/2021</a:t>
             </a:fld>
             <a:endParaRPr lang="en-GB"/>
           </a:p>
@@ -3023,7 +3111,7 @@
           <a:p>
             <a:fld id="{565E3272-2692-4CBA-BB89-AE4B7AF62778}" type="datetimeFigureOut">
               <a:rPr lang="en-GB" smtClean="0"/>
-              <a:t>25/10/2021</a:t>
+              <a:t>26/10/2021</a:t>
             </a:fld>
             <a:endParaRPr lang="en-GB"/>
           </a:p>
@@ -3165,7 +3253,7 @@
           <a:p>
             <a:fld id="{565E3272-2692-4CBA-BB89-AE4B7AF62778}" type="datetimeFigureOut">
               <a:rPr lang="en-GB" smtClean="0"/>
-              <a:t>25/10/2021</a:t>
+              <a:t>26/10/2021</a:t>
             </a:fld>
             <a:endParaRPr lang="en-GB"/>
           </a:p>
@@ -3278,7 +3366,7 @@
           <a:p>
             <a:fld id="{565E3272-2692-4CBA-BB89-AE4B7AF62778}" type="datetimeFigureOut">
               <a:rPr lang="en-GB" smtClean="0"/>
-              <a:t>25/10/2021</a:t>
+              <a:t>26/10/2021</a:t>
             </a:fld>
             <a:endParaRPr lang="en-GB"/>
           </a:p>
@@ -3591,7 +3679,7 @@
           <a:p>
             <a:fld id="{565E3272-2692-4CBA-BB89-AE4B7AF62778}" type="datetimeFigureOut">
               <a:rPr lang="en-GB" smtClean="0"/>
-              <a:t>25/10/2021</a:t>
+              <a:t>26/10/2021</a:t>
             </a:fld>
             <a:endParaRPr lang="en-GB"/>
           </a:p>
@@ -3880,7 +3968,7 @@
           <a:p>
             <a:fld id="{565E3272-2692-4CBA-BB89-AE4B7AF62778}" type="datetimeFigureOut">
               <a:rPr lang="en-GB" smtClean="0"/>
-              <a:t>25/10/2021</a:t>
+              <a:t>26/10/2021</a:t>
             </a:fld>
             <a:endParaRPr lang="en-GB"/>
           </a:p>
@@ -4123,7 +4211,7 @@
           <a:p>
             <a:fld id="{565E3272-2692-4CBA-BB89-AE4B7AF62778}" type="datetimeFigureOut">
               <a:rPr lang="en-GB" smtClean="0"/>
-              <a:t>25/10/2021</a:t>
+              <a:t>26/10/2021</a:t>
             </a:fld>
             <a:endParaRPr lang="en-GB"/>
           </a:p>
@@ -11363,12 +11451,8 @@
           <a:p>
             <a:pPr algn="ctr"/>
             <a:r>
-              <a:rPr lang="en-GB" dirty="0" err="1"/>
-              <a:t>UI_check</a:t>
-            </a:r>
-            <a:r>
               <a:rPr lang="en-GB" dirty="0"/>
-              <a:t> creates the following UI objects: </a:t>
+              <a:t>UI_check creates the following UI objects: </a:t>
             </a:r>
             <a:r>
               <a:rPr lang="en-GB" sz="1200" dirty="0"/>
@@ -11720,15 +11804,7 @@
           <a:p>
             <a:r>
               <a:rPr lang="en-GB" dirty="0"/>
-              <a:t>This is done via the </a:t>
-            </a:r>
-            <a:r>
-              <a:rPr lang="en-GB" dirty="0" err="1"/>
-              <a:t>create_modal</a:t>
-            </a:r>
-            <a:r>
-              <a:rPr lang="en-GB" dirty="0"/>
-              <a:t> function:</a:t>
+              <a:t>This is done via the create_modal function:</a:t>
             </a:r>
           </a:p>
           <a:p>
@@ -11738,23 +11814,7 @@
             </a:pPr>
             <a:r>
               <a:rPr lang="en-GB" dirty="0"/>
-              <a:t>Creates </a:t>
-            </a:r>
-            <a:r>
-              <a:rPr lang="en-GB" dirty="0" err="1"/>
-              <a:t>modalDialog</a:t>
-            </a:r>
-            <a:r>
-              <a:rPr lang="en-GB" dirty="0"/>
-              <a:t> with UI output DG1modelling (for example – this would be taken from the “</a:t>
-            </a:r>
-            <a:r>
-              <a:rPr lang="en-GB" dirty="0" err="1"/>
-              <a:t>comments_modelling_log.R</a:t>
-            </a:r>
-            <a:r>
-              <a:rPr lang="en-GB" dirty="0"/>
-              <a:t>”)</a:t>
+              <a:t>Creates modalDialog with UI output DG1modelling (for example – this would be taken from the “comments_modelling_log.R”)</a:t>
             </a:r>
           </a:p>
         </p:txBody>
@@ -11842,15 +11902,7 @@
           <a:p>
             <a:r>
               <a:rPr lang="en-GB" dirty="0"/>
-              <a:t>Created using </a:t>
-            </a:r>
-            <a:r>
-              <a:rPr lang="en-GB" dirty="0" err="1"/>
-              <a:t>rating_options</a:t>
-            </a:r>
-            <a:r>
-              <a:rPr lang="en-GB" dirty="0"/>
-              <a:t> function:</a:t>
+              <a:t>Created using rating_options function:</a:t>
             </a:r>
           </a:p>
           <a:p>
@@ -12150,12 +12202,987 @@
             <p:ph idx="1"/>
           </p:nvPr>
         </p:nvSpPr>
-        <p:spPr/>
-        <p:txBody>
-          <a:bodyPr/>
-          <a:lstStyle/>
-          <a:p>
-            <a:endParaRPr lang="en-GB"/>
+        <p:spPr>
+          <a:xfrm>
+            <a:off x="838200" y="1625327"/>
+            <a:ext cx="10515600" cy="636786"/>
+          </a:xfrm>
+        </p:spPr>
+        <p:txBody>
+          <a:bodyPr>
+            <a:normAutofit lnSpcReduction="10000"/>
+          </a:bodyPr>
+          <a:lstStyle/>
+          <a:p>
+            <a:pPr marL="0" indent="0">
+              <a:buNone/>
+            </a:pPr>
+            <a:r>
+              <a:rPr lang="en-GB" sz="2000" dirty="0"/>
+              <a:t>To give a warning message </a:t>
+            </a:r>
+            <a:r>
+              <a:rPr lang="en-GB" sz="2000" i="1" dirty="0"/>
+              <a:t>“You have unsaved changes!” </a:t>
+            </a:r>
+            <a:r>
+              <a:rPr lang="en-GB" sz="2000" dirty="0"/>
+              <a:t>we create two dataframes – one from SQL data, one from current app status – and compare the two.</a:t>
+            </a:r>
+          </a:p>
+        </p:txBody>
+      </p:sp>
+      <p:sp>
+        <p:nvSpPr>
+          <p:cNvPr id="4" name="TextBox 3">
+            <a:extLst>
+              <a:ext uri="{FF2B5EF4-FFF2-40B4-BE49-F238E27FC236}">
+                <a16:creationId xmlns:a16="http://schemas.microsoft.com/office/drawing/2014/main" id="{39D4075E-9B29-4E22-BA6C-DA3BD9D0C6AA}"/>
+              </a:ext>
+            </a:extLst>
+          </p:cNvPr>
+          <p:cNvSpPr txBox="1"/>
+          <p:nvPr/>
+        </p:nvSpPr>
+        <p:spPr>
+          <a:xfrm>
+            <a:off x="574766" y="2262113"/>
+            <a:ext cx="3901441" cy="2523768"/>
+          </a:xfrm>
+          <a:prstGeom prst="rect">
+            <a:avLst/>
+          </a:prstGeom>
+          <a:solidFill>
+            <a:schemeClr val="accent1">
+              <a:lumMod val="40000"/>
+              <a:lumOff val="60000"/>
+            </a:schemeClr>
+          </a:solidFill>
+          <a:ln/>
+        </p:spPr>
+        <p:style>
+          <a:lnRef idx="2">
+            <a:schemeClr val="accent1"/>
+          </a:lnRef>
+          <a:fillRef idx="1">
+            <a:schemeClr val="lt1"/>
+          </a:fillRef>
+          <a:effectRef idx="0">
+            <a:schemeClr val="accent1"/>
+          </a:effectRef>
+          <a:fontRef idx="minor">
+            <a:schemeClr val="dk1"/>
+          </a:fontRef>
+        </p:style>
+        <p:txBody>
+          <a:bodyPr wrap="square" rtlCol="0">
+            <a:spAutoFit/>
+          </a:bodyPr>
+          <a:lstStyle/>
+          <a:p>
+            <a:pPr algn="ctr"/>
+            <a:r>
+              <a:rPr lang="en-GB" dirty="0"/>
+              <a:t>Reading in from SQL:</a:t>
+            </a:r>
+          </a:p>
+          <a:p>
+            <a:pPr marL="285750" indent="-285750" algn="ctr">
+              <a:buFont typeface="Arial" panose="020B0604020202020204" pitchFamily="34" charset="0"/>
+              <a:buChar char="•"/>
+            </a:pPr>
+            <a:r>
+              <a:rPr lang="en-GB" sz="1400" dirty="0"/>
+              <a:t>Obtain projectID from app</a:t>
+            </a:r>
+          </a:p>
+          <a:p>
+            <a:pPr marL="285750" indent="-285750" algn="ctr">
+              <a:buFont typeface="Arial" panose="020B0604020202020204" pitchFamily="34" charset="0"/>
+              <a:buChar char="•"/>
+            </a:pPr>
+            <a:r>
+              <a:rPr lang="en-GB" sz="1400" dirty="0"/>
+              <a:t>Find relevant row in dbo.QA_log</a:t>
+            </a:r>
+          </a:p>
+          <a:p>
+            <a:pPr marL="285750" indent="-285750" algn="ctr">
+              <a:buFont typeface="Arial" panose="020B0604020202020204" pitchFamily="34" charset="0"/>
+              <a:buChar char="•"/>
+            </a:pPr>
+            <a:r>
+              <a:rPr lang="en-GB" sz="1400" dirty="0"/>
+              <a:t>If row doesn’t exist (i.e. brand new log, never been saved before), create a row of blank data</a:t>
+            </a:r>
+          </a:p>
+          <a:p>
+            <a:pPr marL="285750" indent="-285750" algn="ctr">
+              <a:buFont typeface="Arial" panose="020B0604020202020204" pitchFamily="34" charset="0"/>
+              <a:buChar char="•"/>
+            </a:pPr>
+            <a:r>
+              <a:rPr lang="en-GB" sz="1400" dirty="0"/>
+              <a:t>Select all relevant rows in dbo.QA_checks (there will be one row for each complete check)</a:t>
+            </a:r>
+          </a:p>
+          <a:p>
+            <a:pPr marL="285750" indent="-285750" algn="ctr">
+              <a:buFont typeface="Arial" panose="020B0604020202020204" pitchFamily="34" charset="0"/>
+              <a:buChar char="•"/>
+            </a:pPr>
+            <a:r>
+              <a:rPr lang="en-GB" sz="1400" dirty="0"/>
+              <a:t>Where a row doesn’t exist for a check, create a row of blank data</a:t>
+            </a:r>
+          </a:p>
+          <a:p>
+            <a:pPr marL="285750" indent="-285750" algn="ctr">
+              <a:buFont typeface="Arial" panose="020B0604020202020204" pitchFamily="34" charset="0"/>
+              <a:buChar char="•"/>
+            </a:pPr>
+            <a:r>
+              <a:rPr lang="en-GB" sz="1400" dirty="0"/>
+              <a:t>We merge this together into a dataframe</a:t>
+            </a:r>
+          </a:p>
+        </p:txBody>
+      </p:sp>
+      <p:graphicFrame>
+        <p:nvGraphicFramePr>
+          <p:cNvPr id="5" name="Table 5">
+            <a:extLst>
+              <a:ext uri="{FF2B5EF4-FFF2-40B4-BE49-F238E27FC236}">
+                <a16:creationId xmlns:a16="http://schemas.microsoft.com/office/drawing/2014/main" id="{89CF16A1-966E-4D4F-802C-1734BAC5BB27}"/>
+              </a:ext>
+            </a:extLst>
+          </p:cNvPr>
+          <p:cNvGraphicFramePr>
+            <a:graphicFrameLocks noGrp="1"/>
+          </p:cNvGraphicFramePr>
+          <p:nvPr>
+            <p:extLst>
+              <p:ext uri="{D42A27DB-BD31-4B8C-83A1-F6EECF244321}">
+                <p14:modId xmlns:p14="http://schemas.microsoft.com/office/powerpoint/2010/main" val="99758414"/>
+              </p:ext>
+            </p:extLst>
+          </p:nvPr>
+        </p:nvGraphicFramePr>
+        <p:xfrm>
+          <a:off x="574766" y="5123225"/>
+          <a:ext cx="4275909" cy="1706880"/>
+        </p:xfrm>
+        <a:graphic>
+          <a:graphicData uri="http://schemas.openxmlformats.org/drawingml/2006/table">
+            <a:tbl>
+              <a:tblPr firstRow="1" bandRow="1">
+                <a:tableStyleId>{3B4B98B0-60AC-42C2-AFA5-B58CD77FA1E5}</a:tableStyleId>
+              </a:tblPr>
+              <a:tblGrid>
+                <a:gridCol w="1425303">
+                  <a:extLst>
+                    <a:ext uri="{9D8B030D-6E8A-4147-A177-3AD203B41FA5}">
+                      <a16:colId xmlns:a16="http://schemas.microsoft.com/office/drawing/2014/main" val="3464945137"/>
+                    </a:ext>
+                  </a:extLst>
+                </a:gridCol>
+                <a:gridCol w="1425303">
+                  <a:extLst>
+                    <a:ext uri="{9D8B030D-6E8A-4147-A177-3AD203B41FA5}">
+                      <a16:colId xmlns:a16="http://schemas.microsoft.com/office/drawing/2014/main" val="507573222"/>
+                    </a:ext>
+                  </a:extLst>
+                </a:gridCol>
+                <a:gridCol w="1425303">
+                  <a:extLst>
+                    <a:ext uri="{9D8B030D-6E8A-4147-A177-3AD203B41FA5}">
+                      <a16:colId xmlns:a16="http://schemas.microsoft.com/office/drawing/2014/main" val="425449427"/>
+                    </a:ext>
+                  </a:extLst>
+                </a:gridCol>
+              </a:tblGrid>
+              <a:tr h="189366">
+                <a:tc>
+                  <a:txBody>
+                    <a:bodyPr/>
+                    <a:lstStyle/>
+                    <a:p>
+                      <a:r>
+                        <a:rPr lang="en-GB" sz="1000" b="0" dirty="0"/>
+                        <a:t>Project ID</a:t>
+                      </a:r>
+                    </a:p>
+                  </a:txBody>
+                  <a:tcPr/>
+                </a:tc>
+                <a:tc>
+                  <a:txBody>
+                    <a:bodyPr/>
+                    <a:lstStyle/>
+                    <a:p>
+                      <a:r>
+                        <a:rPr lang="en-GB" sz="1000" b="0" dirty="0"/>
+                        <a:t>Project ID</a:t>
+                      </a:r>
+                    </a:p>
+                  </a:txBody>
+                  <a:tcPr/>
+                </a:tc>
+                <a:tc>
+                  <a:txBody>
+                    <a:bodyPr/>
+                    <a:lstStyle/>
+                    <a:p>
+                      <a:r>
+                        <a:rPr lang="en-GB" sz="1000" b="0" dirty="0"/>
+                        <a:t>Project ID</a:t>
+                      </a:r>
+                    </a:p>
+                  </a:txBody>
+                  <a:tcPr/>
+                </a:tc>
+                <a:extLst>
+                  <a:ext uri="{0D108BD9-81ED-4DB2-BD59-A6C34878D82A}">
+                    <a16:rowId xmlns:a16="http://schemas.microsoft.com/office/drawing/2014/main" val="790216178"/>
+                  </a:ext>
+                </a:extLst>
+              </a:tr>
+              <a:tr h="189366">
+                <a:tc>
+                  <a:txBody>
+                    <a:bodyPr/>
+                    <a:lstStyle/>
+                    <a:p>
+                      <a:r>
+                        <a:rPr lang="en-GB" sz="1000" dirty="0"/>
+                        <a:t>Project name</a:t>
+                      </a:r>
+                    </a:p>
+                  </a:txBody>
+                  <a:tcPr/>
+                </a:tc>
+                <a:tc>
+                  <a:txBody>
+                    <a:bodyPr/>
+                    <a:lstStyle/>
+                    <a:p>
+                      <a:r>
+                        <a:rPr lang="en-GB" sz="1000" dirty="0"/>
+                        <a:t>DG1</a:t>
+                      </a:r>
+                    </a:p>
+                  </a:txBody>
+                  <a:tcPr/>
+                </a:tc>
+                <a:tc>
+                  <a:txBody>
+                    <a:bodyPr/>
+                    <a:lstStyle/>
+                    <a:p>
+                      <a:r>
+                        <a:rPr lang="en-GB" sz="1000" dirty="0"/>
+                        <a:t>DG2</a:t>
+                      </a:r>
+                    </a:p>
+                  </a:txBody>
+                  <a:tcPr/>
+                </a:tc>
+                <a:extLst>
+                  <a:ext uri="{0D108BD9-81ED-4DB2-BD59-A6C34878D82A}">
+                    <a16:rowId xmlns:a16="http://schemas.microsoft.com/office/drawing/2014/main" val="1388748554"/>
+                  </a:ext>
+                </a:extLst>
+              </a:tr>
+              <a:tr h="189366">
+                <a:tc>
+                  <a:txBody>
+                    <a:bodyPr/>
+                    <a:lstStyle/>
+                    <a:p>
+                      <a:r>
+                        <a:rPr lang="en-GB" sz="1000" dirty="0"/>
+                        <a:t>Version</a:t>
+                      </a:r>
+                    </a:p>
+                  </a:txBody>
+                  <a:tcPr/>
+                </a:tc>
+                <a:tc>
+                  <a:txBody>
+                    <a:bodyPr/>
+                    <a:lstStyle/>
+                    <a:p>
+                      <a:r>
+                        <a:rPr lang="en-GB" sz="1000" dirty="0"/>
+                        <a:t>DG1 rating</a:t>
+                      </a:r>
+                    </a:p>
+                  </a:txBody>
+                  <a:tcPr/>
+                </a:tc>
+                <a:tc>
+                  <a:txBody>
+                    <a:bodyPr/>
+                    <a:lstStyle/>
+                    <a:p>
+                      <a:r>
+                        <a:rPr lang="en-GB" sz="1000" dirty="0"/>
+                        <a:t>DG2 rating</a:t>
+                      </a:r>
+                    </a:p>
+                  </a:txBody>
+                  <a:tcPr/>
+                </a:tc>
+                <a:extLst>
+                  <a:ext uri="{0D108BD9-81ED-4DB2-BD59-A6C34878D82A}">
+                    <a16:rowId xmlns:a16="http://schemas.microsoft.com/office/drawing/2014/main" val="1948033827"/>
+                  </a:ext>
+                </a:extLst>
+              </a:tr>
+              <a:tr h="189366">
+                <a:tc>
+                  <a:txBody>
+                    <a:bodyPr/>
+                    <a:lstStyle/>
+                    <a:p>
+                      <a:r>
+                        <a:rPr lang="en-GB" sz="1000" dirty="0"/>
+                        <a:t>Lead Analyst</a:t>
+                      </a:r>
+                    </a:p>
+                  </a:txBody>
+                  <a:tcPr/>
+                </a:tc>
+                <a:tc>
+                  <a:txBody>
+                    <a:bodyPr/>
+                    <a:lstStyle/>
+                    <a:p>
+                      <a:r>
+                        <a:rPr lang="en-GB" sz="1000" dirty="0"/>
+                        <a:t>DG1 assessor</a:t>
+                      </a:r>
+                    </a:p>
+                  </a:txBody>
+                  <a:tcPr/>
+                </a:tc>
+                <a:tc>
+                  <a:txBody>
+                    <a:bodyPr/>
+                    <a:lstStyle/>
+                    <a:p>
+                      <a:r>
+                        <a:rPr lang="en-GB" sz="1000" dirty="0"/>
+                        <a:t>DG2 assessor</a:t>
+                      </a:r>
+                    </a:p>
+                  </a:txBody>
+                  <a:tcPr/>
+                </a:tc>
+                <a:extLst>
+                  <a:ext uri="{0D108BD9-81ED-4DB2-BD59-A6C34878D82A}">
+                    <a16:rowId xmlns:a16="http://schemas.microsoft.com/office/drawing/2014/main" val="1170233222"/>
+                  </a:ext>
+                </a:extLst>
+              </a:tr>
+              <a:tr h="189366">
+                <a:tc>
+                  <a:txBody>
+                    <a:bodyPr/>
+                    <a:lstStyle/>
+                    <a:p>
+                      <a:r>
+                        <a:rPr lang="en-GB" sz="1000" dirty="0"/>
+                        <a:t>Analytical Assurer</a:t>
+                      </a:r>
+                    </a:p>
+                  </a:txBody>
+                  <a:tcPr/>
+                </a:tc>
+                <a:tc>
+                  <a:txBody>
+                    <a:bodyPr/>
+                    <a:lstStyle/>
+                    <a:p>
+                      <a:r>
+                        <a:rPr lang="en-GB" sz="1000" dirty="0"/>
+                        <a:t>DG1 Evidence</a:t>
+                      </a:r>
+                    </a:p>
+                  </a:txBody>
+                  <a:tcPr/>
+                </a:tc>
+                <a:tc>
+                  <a:txBody>
+                    <a:bodyPr/>
+                    <a:lstStyle/>
+                    <a:p>
+                      <a:r>
+                        <a:rPr lang="en-GB" sz="1000" dirty="0"/>
+                        <a:t>DG2 Evidence</a:t>
+                      </a:r>
+                    </a:p>
+                  </a:txBody>
+                  <a:tcPr/>
+                </a:tc>
+                <a:extLst>
+                  <a:ext uri="{0D108BD9-81ED-4DB2-BD59-A6C34878D82A}">
+                    <a16:rowId xmlns:a16="http://schemas.microsoft.com/office/drawing/2014/main" val="1893517962"/>
+                  </a:ext>
+                </a:extLst>
+              </a:tr>
+              <a:tr h="189366">
+                <a:tc>
+                  <a:txBody>
+                    <a:bodyPr/>
+                    <a:lstStyle/>
+                    <a:p>
+                      <a:r>
+                        <a:rPr lang="en-GB" sz="1000" dirty="0"/>
+                        <a:t>BCM?</a:t>
+                      </a:r>
+                    </a:p>
+                  </a:txBody>
+                  <a:tcPr/>
+                </a:tc>
+                <a:tc>
+                  <a:txBody>
+                    <a:bodyPr/>
+                    <a:lstStyle/>
+                    <a:p>
+                      <a:r>
+                        <a:rPr lang="en-GB" sz="1000" dirty="0"/>
+                        <a:t>DG1 Observations</a:t>
+                      </a:r>
+                    </a:p>
+                  </a:txBody>
+                  <a:tcPr/>
+                </a:tc>
+                <a:tc>
+                  <a:txBody>
+                    <a:bodyPr/>
+                    <a:lstStyle/>
+                    <a:p>
+                      <a:r>
+                        <a:rPr lang="en-GB" sz="1000" dirty="0"/>
+                        <a:t>DG2 Observations</a:t>
+                      </a:r>
+                    </a:p>
+                  </a:txBody>
+                  <a:tcPr/>
+                </a:tc>
+                <a:extLst>
+                  <a:ext uri="{0D108BD9-81ED-4DB2-BD59-A6C34878D82A}">
+                    <a16:rowId xmlns:a16="http://schemas.microsoft.com/office/drawing/2014/main" val="3107378113"/>
+                  </a:ext>
+                </a:extLst>
+              </a:tr>
+              <a:tr h="189366">
+                <a:tc>
+                  <a:txBody>
+                    <a:bodyPr/>
+                    <a:lstStyle/>
+                    <a:p>
+                      <a:r>
+                        <a:rPr lang="en-GB" sz="1000" dirty="0"/>
+                        <a:t>Log type</a:t>
+                      </a:r>
+                    </a:p>
+                  </a:txBody>
+                  <a:tcPr/>
+                </a:tc>
+                <a:tc>
+                  <a:txBody>
+                    <a:bodyPr/>
+                    <a:lstStyle/>
+                    <a:p>
+                      <a:r>
+                        <a:rPr lang="en-GB" sz="1000" dirty="0"/>
+                        <a:t>DG1 Outstanding</a:t>
+                      </a:r>
+                    </a:p>
+                  </a:txBody>
+                  <a:tcPr/>
+                </a:tc>
+                <a:tc>
+                  <a:txBody>
+                    <a:bodyPr/>
+                    <a:lstStyle/>
+                    <a:p>
+                      <a:r>
+                        <a:rPr lang="en-GB" sz="1000" dirty="0"/>
+                        <a:t>DG2 Outstanding</a:t>
+                      </a:r>
+                    </a:p>
+                  </a:txBody>
+                  <a:tcPr/>
+                </a:tc>
+                <a:extLst>
+                  <a:ext uri="{0D108BD9-81ED-4DB2-BD59-A6C34878D82A}">
+                    <a16:rowId xmlns:a16="http://schemas.microsoft.com/office/drawing/2014/main" val="2342507693"/>
+                  </a:ext>
+                </a:extLst>
+              </a:tr>
+            </a:tbl>
+          </a:graphicData>
+        </a:graphic>
+      </p:graphicFrame>
+      <p:sp>
+        <p:nvSpPr>
+          <p:cNvPr id="6" name="TextBox 5">
+            <a:extLst>
+              <a:ext uri="{FF2B5EF4-FFF2-40B4-BE49-F238E27FC236}">
+                <a16:creationId xmlns:a16="http://schemas.microsoft.com/office/drawing/2014/main" id="{E971134A-952A-47AE-9281-909EBB7A6922}"/>
+              </a:ext>
+            </a:extLst>
+          </p:cNvPr>
+          <p:cNvSpPr txBox="1"/>
+          <p:nvPr/>
+        </p:nvSpPr>
+        <p:spPr>
+          <a:xfrm>
+            <a:off x="513805" y="4785276"/>
+            <a:ext cx="3899016" cy="338554"/>
+          </a:xfrm>
+          <a:prstGeom prst="rect">
+            <a:avLst/>
+          </a:prstGeom>
+          <a:noFill/>
+        </p:spPr>
+        <p:txBody>
+          <a:bodyPr wrap="none" rtlCol="0">
+            <a:spAutoFit/>
+          </a:bodyPr>
+          <a:lstStyle/>
+          <a:p>
+            <a:r>
+              <a:rPr lang="en-GB" sz="1600" dirty="0"/>
+              <a:t>Example of first three columns of dataframe:</a:t>
+            </a:r>
+          </a:p>
+        </p:txBody>
+      </p:sp>
+      <p:sp>
+        <p:nvSpPr>
+          <p:cNvPr id="7" name="TextBox 6">
+            <a:extLst>
+              <a:ext uri="{FF2B5EF4-FFF2-40B4-BE49-F238E27FC236}">
+                <a16:creationId xmlns:a16="http://schemas.microsoft.com/office/drawing/2014/main" id="{53E68661-A9D7-440F-930B-F083407722A6}"/>
+              </a:ext>
+            </a:extLst>
+          </p:cNvPr>
+          <p:cNvSpPr txBox="1"/>
+          <p:nvPr/>
+        </p:nvSpPr>
+        <p:spPr>
+          <a:xfrm>
+            <a:off x="4963886" y="3064180"/>
+            <a:ext cx="1550125" cy="1015663"/>
+          </a:xfrm>
+          <a:prstGeom prst="rect">
+            <a:avLst/>
+          </a:prstGeom>
+          <a:noFill/>
+        </p:spPr>
+        <p:txBody>
+          <a:bodyPr wrap="square" rtlCol="0">
+            <a:spAutoFit/>
+          </a:bodyPr>
+          <a:lstStyle/>
+          <a:p>
+            <a:r>
+              <a:rPr lang="en-GB" sz="1200" dirty="0"/>
+              <a:t>Blank rows are necessary so that both dataframes are same size to allow us to compare</a:t>
+            </a:r>
+          </a:p>
+        </p:txBody>
+      </p:sp>
+      <p:cxnSp>
+        <p:nvCxnSpPr>
+          <p:cNvPr id="9" name="Straight Arrow Connector 8">
+            <a:extLst>
+              <a:ext uri="{FF2B5EF4-FFF2-40B4-BE49-F238E27FC236}">
+                <a16:creationId xmlns:a16="http://schemas.microsoft.com/office/drawing/2014/main" id="{2AEE66B2-599C-4D36-AC5F-01F1AC2523F2}"/>
+              </a:ext>
+            </a:extLst>
+          </p:cNvPr>
+          <p:cNvCxnSpPr>
+            <a:cxnSpLocks/>
+          </p:cNvCxnSpPr>
+          <p:nvPr/>
+        </p:nvCxnSpPr>
+        <p:spPr>
+          <a:xfrm flipH="1">
+            <a:off x="4355003" y="3352800"/>
+            <a:ext cx="608884" cy="0"/>
+          </a:xfrm>
+          <a:prstGeom prst="straightConnector1">
+            <a:avLst/>
+          </a:prstGeom>
+          <a:ln>
+            <a:solidFill>
+              <a:schemeClr val="accent6">
+                <a:lumMod val="75000"/>
+              </a:schemeClr>
+            </a:solidFill>
+            <a:tailEnd type="triangle"/>
+          </a:ln>
+        </p:spPr>
+        <p:style>
+          <a:lnRef idx="1">
+            <a:schemeClr val="accent1"/>
+          </a:lnRef>
+          <a:fillRef idx="0">
+            <a:schemeClr val="accent1"/>
+          </a:fillRef>
+          <a:effectRef idx="0">
+            <a:schemeClr val="accent1"/>
+          </a:effectRef>
+          <a:fontRef idx="minor">
+            <a:schemeClr val="tx1"/>
+          </a:fontRef>
+        </p:style>
+      </p:cxnSp>
+      <p:cxnSp>
+        <p:nvCxnSpPr>
+          <p:cNvPr id="10" name="Straight Arrow Connector 9">
+            <a:extLst>
+              <a:ext uri="{FF2B5EF4-FFF2-40B4-BE49-F238E27FC236}">
+                <a16:creationId xmlns:a16="http://schemas.microsoft.com/office/drawing/2014/main" id="{18958671-7DD6-48A5-9F0A-FA367BD106E0}"/>
+              </a:ext>
+            </a:extLst>
+          </p:cNvPr>
+          <p:cNvCxnSpPr>
+            <a:cxnSpLocks/>
+          </p:cNvCxnSpPr>
+          <p:nvPr/>
+        </p:nvCxnSpPr>
+        <p:spPr>
+          <a:xfrm flipH="1">
+            <a:off x="4355003" y="3753394"/>
+            <a:ext cx="608883" cy="570412"/>
+          </a:xfrm>
+          <a:prstGeom prst="straightConnector1">
+            <a:avLst/>
+          </a:prstGeom>
+          <a:ln>
+            <a:solidFill>
+              <a:schemeClr val="accent6">
+                <a:lumMod val="75000"/>
+              </a:schemeClr>
+            </a:solidFill>
+            <a:tailEnd type="triangle"/>
+          </a:ln>
+        </p:spPr>
+        <p:style>
+          <a:lnRef idx="1">
+            <a:schemeClr val="accent1"/>
+          </a:lnRef>
+          <a:fillRef idx="0">
+            <a:schemeClr val="accent1"/>
+          </a:fillRef>
+          <a:effectRef idx="0">
+            <a:schemeClr val="accent1"/>
+          </a:effectRef>
+          <a:fontRef idx="minor">
+            <a:schemeClr val="tx1"/>
+          </a:fontRef>
+        </p:style>
+      </p:cxnSp>
+      <p:sp>
+        <p:nvSpPr>
+          <p:cNvPr id="13" name="TextBox 12">
+            <a:extLst>
+              <a:ext uri="{FF2B5EF4-FFF2-40B4-BE49-F238E27FC236}">
+                <a16:creationId xmlns:a16="http://schemas.microsoft.com/office/drawing/2014/main" id="{FD835AAF-E2BA-4373-9EE6-5209ADF8FF15}"/>
+              </a:ext>
+            </a:extLst>
+          </p:cNvPr>
+          <p:cNvSpPr txBox="1"/>
+          <p:nvPr/>
+        </p:nvSpPr>
+        <p:spPr>
+          <a:xfrm>
+            <a:off x="6675120" y="2261811"/>
+            <a:ext cx="3901441" cy="2092881"/>
+          </a:xfrm>
+          <a:prstGeom prst="rect">
+            <a:avLst/>
+          </a:prstGeom>
+          <a:solidFill>
+            <a:schemeClr val="accent1">
+              <a:lumMod val="40000"/>
+              <a:lumOff val="60000"/>
+            </a:schemeClr>
+          </a:solidFill>
+          <a:ln/>
+        </p:spPr>
+        <p:style>
+          <a:lnRef idx="2">
+            <a:schemeClr val="accent1"/>
+          </a:lnRef>
+          <a:fillRef idx="1">
+            <a:schemeClr val="lt1"/>
+          </a:fillRef>
+          <a:effectRef idx="0">
+            <a:schemeClr val="accent1"/>
+          </a:effectRef>
+          <a:fontRef idx="minor">
+            <a:schemeClr val="dk1"/>
+          </a:fontRef>
+        </p:style>
+        <p:txBody>
+          <a:bodyPr wrap="square" rtlCol="0">
+            <a:spAutoFit/>
+          </a:bodyPr>
+          <a:lstStyle/>
+          <a:p>
+            <a:pPr algn="ctr"/>
+            <a:r>
+              <a:rPr lang="en-GB" dirty="0"/>
+              <a:t>Reading in from app:</a:t>
+            </a:r>
+          </a:p>
+          <a:p>
+            <a:pPr marL="285750" indent="-285750" algn="ctr">
+              <a:buFont typeface="Arial" panose="020B0604020202020204" pitchFamily="34" charset="0"/>
+              <a:buChar char="•"/>
+            </a:pPr>
+            <a:r>
+              <a:rPr lang="en-GB" sz="1400" dirty="0"/>
+              <a:t>Manually create row that matches row in dbo.QA_log</a:t>
+            </a:r>
+          </a:p>
+          <a:p>
+            <a:pPr marL="285750" indent="-285750" algn="ctr">
+              <a:buFont typeface="Arial" panose="020B0604020202020204" pitchFamily="34" charset="0"/>
+              <a:buChar char="•"/>
+            </a:pPr>
+            <a:r>
+              <a:rPr lang="en-GB" sz="1400" dirty="0"/>
+              <a:t>Use </a:t>
+            </a:r>
+            <a:r>
+              <a:rPr lang="en-GB" sz="1400" dirty="0" err="1"/>
+              <a:t>paste_other_input</a:t>
+            </a:r>
+            <a:r>
+              <a:rPr lang="en-GB" sz="1400" dirty="0"/>
+              <a:t> to create row that matches those in dbo.QA_checks</a:t>
+            </a:r>
+          </a:p>
+          <a:p>
+            <a:pPr marL="285750" indent="-285750" algn="ctr">
+              <a:buFont typeface="Arial" panose="020B0604020202020204" pitchFamily="34" charset="0"/>
+              <a:buChar char="•"/>
+            </a:pPr>
+            <a:r>
+              <a:rPr lang="en-GB" sz="1400" dirty="0"/>
+              <a:t>This is run over all check IDs using </a:t>
+            </a:r>
+            <a:r>
+              <a:rPr lang="en-GB" sz="1400" dirty="0" err="1"/>
+              <a:t>sapply</a:t>
+            </a:r>
+            <a:r>
+              <a:rPr lang="en-GB" sz="1400" dirty="0"/>
+              <a:t> function</a:t>
+            </a:r>
+          </a:p>
+          <a:p>
+            <a:pPr marL="285750" indent="-285750" algn="ctr">
+              <a:buFont typeface="Arial" panose="020B0604020202020204" pitchFamily="34" charset="0"/>
+              <a:buChar char="•"/>
+            </a:pPr>
+            <a:r>
+              <a:rPr lang="en-GB" sz="1400" dirty="0"/>
+              <a:t>Everything merged together into one dataframe</a:t>
+            </a:r>
+          </a:p>
+        </p:txBody>
+      </p:sp>
+      <p:sp>
+        <p:nvSpPr>
+          <p:cNvPr id="14" name="TextBox 13">
+            <a:extLst>
+              <a:ext uri="{FF2B5EF4-FFF2-40B4-BE49-F238E27FC236}">
+                <a16:creationId xmlns:a16="http://schemas.microsoft.com/office/drawing/2014/main" id="{7554888D-BC3B-47D5-A119-2EA8DE05AA0F}"/>
+              </a:ext>
+            </a:extLst>
+          </p:cNvPr>
+          <p:cNvSpPr txBox="1"/>
+          <p:nvPr/>
+        </p:nvSpPr>
+        <p:spPr>
+          <a:xfrm>
+            <a:off x="6675119" y="5232673"/>
+            <a:ext cx="3901441" cy="1169551"/>
+          </a:xfrm>
+          <a:prstGeom prst="rect">
+            <a:avLst/>
+          </a:prstGeom>
+          <a:solidFill>
+            <a:schemeClr val="accent1">
+              <a:lumMod val="40000"/>
+              <a:lumOff val="60000"/>
+            </a:schemeClr>
+          </a:solidFill>
+          <a:ln/>
+        </p:spPr>
+        <p:style>
+          <a:lnRef idx="2">
+            <a:schemeClr val="accent1"/>
+          </a:lnRef>
+          <a:fillRef idx="1">
+            <a:schemeClr val="lt1"/>
+          </a:fillRef>
+          <a:effectRef idx="0">
+            <a:schemeClr val="accent1"/>
+          </a:effectRef>
+          <a:fontRef idx="minor">
+            <a:schemeClr val="dk1"/>
+          </a:fontRef>
+        </p:style>
+        <p:txBody>
+          <a:bodyPr wrap="square" rtlCol="0">
+            <a:spAutoFit/>
+          </a:bodyPr>
+          <a:lstStyle/>
+          <a:p>
+            <a:pPr algn="ctr"/>
+            <a:r>
+              <a:rPr lang="en-GB" sz="1400" dirty="0"/>
+              <a:t>Dataframes are compared.</a:t>
+            </a:r>
+          </a:p>
+          <a:p>
+            <a:pPr algn="ctr"/>
+            <a:r>
+              <a:rPr lang="en-GB" sz="1400" dirty="0"/>
+              <a:t>If not equal, an error message is printed.</a:t>
+            </a:r>
+          </a:p>
+          <a:p>
+            <a:pPr algn="ctr"/>
+            <a:r>
+              <a:rPr lang="en-GB" sz="1400" dirty="0"/>
+              <a:t>Whenever “Save” button is pressed, the “Reading in from SQL” is repeated, and comparison is </a:t>
+            </a:r>
+            <a:r>
+              <a:rPr lang="en-GB" sz="1400"/>
+              <a:t>run again.</a:t>
+            </a:r>
+            <a:endParaRPr lang="en-GB" sz="1400" dirty="0"/>
+          </a:p>
+        </p:txBody>
+      </p:sp>
+      <p:sp>
+        <p:nvSpPr>
+          <p:cNvPr id="15" name="TextBox 14">
+            <a:extLst>
+              <a:ext uri="{FF2B5EF4-FFF2-40B4-BE49-F238E27FC236}">
+                <a16:creationId xmlns:a16="http://schemas.microsoft.com/office/drawing/2014/main" id="{1B4D1569-2450-45CD-BAFC-ED44CEB55C8C}"/>
+              </a:ext>
+            </a:extLst>
+          </p:cNvPr>
+          <p:cNvSpPr txBox="1"/>
+          <p:nvPr/>
+        </p:nvSpPr>
+        <p:spPr>
+          <a:xfrm>
+            <a:off x="9875521" y="2022626"/>
+            <a:ext cx="1976845" cy="523220"/>
+          </a:xfrm>
+          <a:prstGeom prst="rect">
+            <a:avLst/>
+          </a:prstGeom>
+          <a:solidFill>
+            <a:schemeClr val="accent4">
+              <a:lumMod val="40000"/>
+              <a:lumOff val="60000"/>
+            </a:schemeClr>
+          </a:solidFill>
+        </p:spPr>
+        <p:style>
+          <a:lnRef idx="2">
+            <a:schemeClr val="accent4"/>
+          </a:lnRef>
+          <a:fillRef idx="1">
+            <a:schemeClr val="lt1"/>
+          </a:fillRef>
+          <a:effectRef idx="0">
+            <a:schemeClr val="accent4"/>
+          </a:effectRef>
+          <a:fontRef idx="minor">
+            <a:schemeClr val="dk1"/>
+          </a:fontRef>
+        </p:style>
+        <p:txBody>
+          <a:bodyPr wrap="square" rtlCol="0">
+            <a:spAutoFit/>
+          </a:bodyPr>
+          <a:lstStyle/>
+          <a:p>
+            <a:pPr algn="ctr"/>
+            <a:r>
+              <a:rPr lang="en-GB" sz="1400" dirty="0"/>
+              <a:t>Updates automatically as changes made in app</a:t>
+            </a:r>
+          </a:p>
+        </p:txBody>
+      </p:sp>
+      <p:sp>
+        <p:nvSpPr>
+          <p:cNvPr id="16" name="TextBox 15">
+            <a:extLst>
+              <a:ext uri="{FF2B5EF4-FFF2-40B4-BE49-F238E27FC236}">
+                <a16:creationId xmlns:a16="http://schemas.microsoft.com/office/drawing/2014/main" id="{DB16DD6B-7F3D-4EAE-8463-2A03B4FE6A0F}"/>
+              </a:ext>
+            </a:extLst>
+          </p:cNvPr>
+          <p:cNvSpPr txBox="1"/>
+          <p:nvPr/>
+        </p:nvSpPr>
+        <p:spPr>
+          <a:xfrm>
+            <a:off x="3975463" y="2170882"/>
+            <a:ext cx="1976845" cy="523220"/>
+          </a:xfrm>
+          <a:prstGeom prst="rect">
+            <a:avLst/>
+          </a:prstGeom>
+          <a:solidFill>
+            <a:schemeClr val="accent4">
+              <a:lumMod val="40000"/>
+              <a:lumOff val="60000"/>
+            </a:schemeClr>
+          </a:solidFill>
+        </p:spPr>
+        <p:style>
+          <a:lnRef idx="2">
+            <a:schemeClr val="accent4"/>
+          </a:lnRef>
+          <a:fillRef idx="1">
+            <a:schemeClr val="lt1"/>
+          </a:fillRef>
+          <a:effectRef idx="0">
+            <a:schemeClr val="accent4"/>
+          </a:effectRef>
+          <a:fontRef idx="minor">
+            <a:schemeClr val="dk1"/>
+          </a:fontRef>
+        </p:style>
+        <p:txBody>
+          <a:bodyPr wrap="square" rtlCol="0">
+            <a:spAutoFit/>
+          </a:bodyPr>
+          <a:lstStyle/>
+          <a:p>
+            <a:pPr algn="ctr"/>
+            <a:r>
+              <a:rPr lang="en-GB" sz="1400" dirty="0"/>
+              <a:t>Has to be updated manually</a:t>
+            </a:r>
           </a:p>
         </p:txBody>
       </p:sp>

</xml_diff>

<commit_message>
Adding in SCD table for QA checks
</commit_message>
<xml_diff>
--- a/QA log app - behind the code.pptx
+++ b/QA log app - behind the code.pptx
@@ -14,6 +14,7 @@
     <p:sldId id="261" r:id="rId8"/>
     <p:sldId id="262" r:id="rId9"/>
     <p:sldId id="265" r:id="rId10"/>
+    <p:sldId id="266" r:id="rId11"/>
   </p:sldIdLst>
   <p:sldSz cx="12192000" cy="6858000"/>
   <p:notesSz cx="6858000" cy="9144000"/>
@@ -123,8 +124,7 @@
 <file path=ppt/revisionInfo.xml><?xml version="1.0" encoding="utf-8"?>
 <p1510:revInfo xmlns:a="http://schemas.openxmlformats.org/drawingml/2006/main" xmlns:r="http://schemas.openxmlformats.org/officeDocument/2006/relationships" xmlns:p1510="http://schemas.microsoft.com/office/powerpoint/2015/10/main">
   <p1510:revLst>
-    <p1510:client id="{21694504-DF36-4190-984B-87BF7BD1C818}" v="87" dt="2021-10-25T14:06:36.756"/>
-    <p1510:client id="{E34FB9E7-6CF7-40FD-83B9-B94EF404FC33}" v="33" dt="2021-10-26T08:00:26.881"/>
+    <p1510:client id="{E34FB9E7-6CF7-40FD-83B9-B94EF404FC33}" v="51" dt="2021-11-02T15:27:46.352"/>
   </p1510:revLst>
 </p1510:revInfo>
 </file>
@@ -133,8 +133,8 @@
 <pc:chgInfo xmlns:a="http://schemas.openxmlformats.org/drawingml/2006/main" xmlns:r="http://schemas.openxmlformats.org/officeDocument/2006/relationships" xmlns:ac="http://schemas.microsoft.com/office/drawing/2013/main/command" xmlns:pc="http://schemas.microsoft.com/office/powerpoint/2013/main/command">
   <pc:docChgLst>
     <pc:chgData name="MORLEY, Thomas" userId="ca0a1631-feee-46f8-9dc6-a0f397eff84f" providerId="ADAL" clId="{E34FB9E7-6CF7-40FD-83B9-B94EF404FC33}"/>
-    <pc:docChg chg="custSel addSld delSld modSld">
-      <pc:chgData name="MORLEY, Thomas" userId="ca0a1631-feee-46f8-9dc6-a0f397eff84f" providerId="ADAL" clId="{E34FB9E7-6CF7-40FD-83B9-B94EF404FC33}" dt="2021-10-26T08:01:03.629" v="2546" actId="20577"/>
+    <pc:docChg chg="undo custSel addSld delSld modSld">
+      <pc:chgData name="MORLEY, Thomas" userId="ca0a1631-feee-46f8-9dc6-a0f397eff84f" providerId="ADAL" clId="{E34FB9E7-6CF7-40FD-83B9-B94EF404FC33}" dt="2021-11-02T15:28:22.966" v="3310" actId="207"/>
       <pc:docMkLst>
         <pc:docMk/>
       </pc:docMkLst>
@@ -474,6 +474,181 @@
             <pc:docMk/>
             <pc:sldMk cId="342339206" sldId="265"/>
             <ac:cxnSpMk id="10" creationId="{18958671-7DD6-48A5-9F0A-FA367BD106E0}"/>
+          </ac:cxnSpMkLst>
+        </pc:cxnChg>
+      </pc:sldChg>
+      <pc:sldChg chg="addSp modSp new mod">
+        <pc:chgData name="MORLEY, Thomas" userId="ca0a1631-feee-46f8-9dc6-a0f397eff84f" providerId="ADAL" clId="{E34FB9E7-6CF7-40FD-83B9-B94EF404FC33}" dt="2021-11-02T15:28:22.966" v="3310" actId="207"/>
+        <pc:sldMkLst>
+          <pc:docMk/>
+          <pc:sldMk cId="2423129868" sldId="266"/>
+        </pc:sldMkLst>
+        <pc:spChg chg="mod">
+          <ac:chgData name="MORLEY, Thomas" userId="ca0a1631-feee-46f8-9dc6-a0f397eff84f" providerId="ADAL" clId="{E34FB9E7-6CF7-40FD-83B9-B94EF404FC33}" dt="2021-11-02T15:19:20.456" v="2568" actId="20577"/>
+          <ac:spMkLst>
+            <pc:docMk/>
+            <pc:sldMk cId="2423129868" sldId="266"/>
+            <ac:spMk id="2" creationId="{5F6791CC-7E1C-4898-8970-C8784B749EC0}"/>
+          </ac:spMkLst>
+        </pc:spChg>
+        <pc:spChg chg="add mod">
+          <ac:chgData name="MORLEY, Thomas" userId="ca0a1631-feee-46f8-9dc6-a0f397eff84f" providerId="ADAL" clId="{E34FB9E7-6CF7-40FD-83B9-B94EF404FC33}" dt="2021-11-02T15:20:08.749" v="2746" actId="20577"/>
+          <ac:spMkLst>
+            <pc:docMk/>
+            <pc:sldMk cId="2423129868" sldId="266"/>
+            <ac:spMk id="3" creationId="{04D1F5BF-9556-4373-A58D-CC26AF09C5AE}"/>
+          </ac:spMkLst>
+        </pc:spChg>
+        <pc:spChg chg="add mod">
+          <ac:chgData name="MORLEY, Thomas" userId="ca0a1631-feee-46f8-9dc6-a0f397eff84f" providerId="ADAL" clId="{E34FB9E7-6CF7-40FD-83B9-B94EF404FC33}" dt="2021-11-02T15:23:41.439" v="2899" actId="1076"/>
+          <ac:spMkLst>
+            <pc:docMk/>
+            <pc:sldMk cId="2423129868" sldId="266"/>
+            <ac:spMk id="4" creationId="{E192288E-89BA-4402-894D-3D715A3EA78D}"/>
+          </ac:spMkLst>
+        </pc:spChg>
+        <pc:spChg chg="add mod">
+          <ac:chgData name="MORLEY, Thomas" userId="ca0a1631-feee-46f8-9dc6-a0f397eff84f" providerId="ADAL" clId="{E34FB9E7-6CF7-40FD-83B9-B94EF404FC33}" dt="2021-11-02T15:23:25.336" v="2894" actId="122"/>
+          <ac:spMkLst>
+            <pc:docMk/>
+            <pc:sldMk cId="2423129868" sldId="266"/>
+            <ac:spMk id="5" creationId="{CEC9B9B1-316C-4739-B075-AE5E33052E66}"/>
+          </ac:spMkLst>
+        </pc:spChg>
+        <pc:spChg chg="add mod">
+          <ac:chgData name="MORLEY, Thomas" userId="ca0a1631-feee-46f8-9dc6-a0f397eff84f" providerId="ADAL" clId="{E34FB9E7-6CF7-40FD-83B9-B94EF404FC33}" dt="2021-11-02T15:23:50.293" v="2901" actId="1076"/>
+          <ac:spMkLst>
+            <pc:docMk/>
+            <pc:sldMk cId="2423129868" sldId="266"/>
+            <ac:spMk id="8" creationId="{F40629F5-4082-49A1-ADD2-1390B4D36469}"/>
+          </ac:spMkLst>
+        </pc:spChg>
+        <pc:spChg chg="add mod">
+          <ac:chgData name="MORLEY, Thomas" userId="ca0a1631-feee-46f8-9dc6-a0f397eff84f" providerId="ADAL" clId="{E34FB9E7-6CF7-40FD-83B9-B94EF404FC33}" dt="2021-11-02T15:23:54.593" v="2904" actId="1076"/>
+          <ac:spMkLst>
+            <pc:docMk/>
+            <pc:sldMk cId="2423129868" sldId="266"/>
+            <ac:spMk id="11" creationId="{E336B898-A9BE-472B-A817-77DE50F417E8}"/>
+          </ac:spMkLst>
+        </pc:spChg>
+        <pc:spChg chg="add mod">
+          <ac:chgData name="MORLEY, Thomas" userId="ca0a1631-feee-46f8-9dc6-a0f397eff84f" providerId="ADAL" clId="{E34FB9E7-6CF7-40FD-83B9-B94EF404FC33}" dt="2021-11-02T15:28:11.494" v="3307" actId="207"/>
+          <ac:spMkLst>
+            <pc:docMk/>
+            <pc:sldMk cId="2423129868" sldId="266"/>
+            <ac:spMk id="12" creationId="{4B040FD5-B036-49C4-93AD-C1BD3F282008}"/>
+          </ac:spMkLst>
+        </pc:spChg>
+        <pc:spChg chg="add mod">
+          <ac:chgData name="MORLEY, Thomas" userId="ca0a1631-feee-46f8-9dc6-a0f397eff84f" providerId="ADAL" clId="{E34FB9E7-6CF7-40FD-83B9-B94EF404FC33}" dt="2021-11-02T15:25:50.059" v="3078" actId="1076"/>
+          <ac:spMkLst>
+            <pc:docMk/>
+            <pc:sldMk cId="2423129868" sldId="266"/>
+            <ac:spMk id="15" creationId="{476C8284-E34B-45AA-BB7B-7C99A398B3CF}"/>
+          </ac:spMkLst>
+        </pc:spChg>
+        <pc:spChg chg="add mod">
+          <ac:chgData name="MORLEY, Thomas" userId="ca0a1631-feee-46f8-9dc6-a0f397eff84f" providerId="ADAL" clId="{E34FB9E7-6CF7-40FD-83B9-B94EF404FC33}" dt="2021-11-02T15:26:24.829" v="3119" actId="1076"/>
+          <ac:spMkLst>
+            <pc:docMk/>
+            <pc:sldMk cId="2423129868" sldId="266"/>
+            <ac:spMk id="16" creationId="{BDF9E54E-C4AD-4ADE-9789-9146DF7DA9EB}"/>
+          </ac:spMkLst>
+        </pc:spChg>
+        <pc:spChg chg="add mod">
+          <ac:chgData name="MORLEY, Thomas" userId="ca0a1631-feee-46f8-9dc6-a0f397eff84f" providerId="ADAL" clId="{E34FB9E7-6CF7-40FD-83B9-B94EF404FC33}" dt="2021-11-02T15:24:53.706" v="3010" actId="1076"/>
+          <ac:spMkLst>
+            <pc:docMk/>
+            <pc:sldMk cId="2423129868" sldId="266"/>
+            <ac:spMk id="17" creationId="{71524C64-9D91-4785-8931-4E43D9A8D27C}"/>
+          </ac:spMkLst>
+        </pc:spChg>
+        <pc:spChg chg="add mod">
+          <ac:chgData name="MORLEY, Thomas" userId="ca0a1631-feee-46f8-9dc6-a0f397eff84f" providerId="ADAL" clId="{E34FB9E7-6CF7-40FD-83B9-B94EF404FC33}" dt="2021-11-02T15:28:20.202" v="3309" actId="207"/>
+          <ac:spMkLst>
+            <pc:docMk/>
+            <pc:sldMk cId="2423129868" sldId="266"/>
+            <ac:spMk id="19" creationId="{A1FC2A3D-67EC-446A-8360-3E69D0E7D2AF}"/>
+          </ac:spMkLst>
+        </pc:spChg>
+        <pc:spChg chg="add mod">
+          <ac:chgData name="MORLEY, Thomas" userId="ca0a1631-feee-46f8-9dc6-a0f397eff84f" providerId="ADAL" clId="{E34FB9E7-6CF7-40FD-83B9-B94EF404FC33}" dt="2021-11-02T15:28:16.261" v="3308" actId="207"/>
+          <ac:spMkLst>
+            <pc:docMk/>
+            <pc:sldMk cId="2423129868" sldId="266"/>
+            <ac:spMk id="25" creationId="{E16BBE8D-72AC-49BB-91DA-B8E16F538BC3}"/>
+          </ac:spMkLst>
+        </pc:spChg>
+        <pc:spChg chg="add mod">
+          <ac:chgData name="MORLEY, Thomas" userId="ca0a1631-feee-46f8-9dc6-a0f397eff84f" providerId="ADAL" clId="{E34FB9E7-6CF7-40FD-83B9-B94EF404FC33}" dt="2021-11-02T15:26:50.300" v="3127" actId="1076"/>
+          <ac:spMkLst>
+            <pc:docMk/>
+            <pc:sldMk cId="2423129868" sldId="266"/>
+            <ac:spMk id="28" creationId="{3FED96C2-2763-4B4E-9FC8-DAC57BD59C74}"/>
+          </ac:spMkLst>
+        </pc:spChg>
+        <pc:spChg chg="add mod">
+          <ac:chgData name="MORLEY, Thomas" userId="ca0a1631-feee-46f8-9dc6-a0f397eff84f" providerId="ADAL" clId="{E34FB9E7-6CF7-40FD-83B9-B94EF404FC33}" dt="2021-11-02T15:28:22.966" v="3310" actId="207"/>
+          <ac:spMkLst>
+            <pc:docMk/>
+            <pc:sldMk cId="2423129868" sldId="266"/>
+            <ac:spMk id="32" creationId="{0224A9E8-4EE4-4100-8E5A-6974A38299F5}"/>
+          </ac:spMkLst>
+        </pc:spChg>
+        <pc:spChg chg="add mod">
+          <ac:chgData name="MORLEY, Thomas" userId="ca0a1631-feee-46f8-9dc6-a0f397eff84f" providerId="ADAL" clId="{E34FB9E7-6CF7-40FD-83B9-B94EF404FC33}" dt="2021-11-02T15:27:49.931" v="3265" actId="1076"/>
+          <ac:spMkLst>
+            <pc:docMk/>
+            <pc:sldMk cId="2423129868" sldId="266"/>
+            <ac:spMk id="33" creationId="{A7F0BA27-FD36-4186-B4B2-0690E52D298F}"/>
+          </ac:spMkLst>
+        </pc:spChg>
+        <pc:cxnChg chg="add">
+          <ac:chgData name="MORLEY, Thomas" userId="ca0a1631-feee-46f8-9dc6-a0f397eff84f" providerId="ADAL" clId="{E34FB9E7-6CF7-40FD-83B9-B94EF404FC33}" dt="2021-11-02T15:23:29.907" v="2895" actId="11529"/>
+          <ac:cxnSpMkLst>
+            <pc:docMk/>
+            <pc:sldMk cId="2423129868" sldId="266"/>
+            <ac:cxnSpMk id="7" creationId="{A468A3A8-41C9-4C16-9A1E-F7B181A2CF57}"/>
+          </ac:cxnSpMkLst>
+        </pc:cxnChg>
+        <pc:cxnChg chg="add">
+          <ac:chgData name="MORLEY, Thomas" userId="ca0a1631-feee-46f8-9dc6-a0f397eff84f" providerId="ADAL" clId="{E34FB9E7-6CF7-40FD-83B9-B94EF404FC33}" dt="2021-11-02T15:23:47.273" v="2900" actId="11529"/>
+          <ac:cxnSpMkLst>
+            <pc:docMk/>
+            <pc:sldMk cId="2423129868" sldId="266"/>
+            <ac:cxnSpMk id="10" creationId="{A0EC1407-84AC-432C-B085-BDCF8F9F58FA}"/>
+          </ac:cxnSpMkLst>
+        </pc:cxnChg>
+        <pc:cxnChg chg="add mod">
+          <ac:chgData name="MORLEY, Thomas" userId="ca0a1631-feee-46f8-9dc6-a0f397eff84f" providerId="ADAL" clId="{E34FB9E7-6CF7-40FD-83B9-B94EF404FC33}" dt="2021-11-02T15:26:24.829" v="3119" actId="1076"/>
+          <ac:cxnSpMkLst>
+            <pc:docMk/>
+            <pc:sldMk cId="2423129868" sldId="266"/>
+            <ac:cxnSpMk id="13" creationId="{7A6CB8DD-5546-4608-9D08-BF96C56D2774}"/>
+          </ac:cxnSpMkLst>
+        </pc:cxnChg>
+        <pc:cxnChg chg="add mod">
+          <ac:chgData name="MORLEY, Thomas" userId="ca0a1631-feee-46f8-9dc6-a0f397eff84f" providerId="ADAL" clId="{E34FB9E7-6CF7-40FD-83B9-B94EF404FC33}" dt="2021-11-02T15:24:59.934" v="3012" actId="1076"/>
+          <ac:cxnSpMkLst>
+            <pc:docMk/>
+            <pc:sldMk cId="2423129868" sldId="266"/>
+            <ac:cxnSpMk id="18" creationId="{43DCDBD7-DA70-4B5F-BA1E-AA4B8AD423D0}"/>
+          </ac:cxnSpMkLst>
+        </pc:cxnChg>
+        <pc:cxnChg chg="add mod">
+          <ac:chgData name="MORLEY, Thomas" userId="ca0a1631-feee-46f8-9dc6-a0f397eff84f" providerId="ADAL" clId="{E34FB9E7-6CF7-40FD-83B9-B94EF404FC33}" dt="2021-11-02T15:26:39.582" v="3124" actId="14100"/>
+          <ac:cxnSpMkLst>
+            <pc:docMk/>
+            <pc:sldMk cId="2423129868" sldId="266"/>
+            <ac:cxnSpMk id="26" creationId="{D242B8A7-2309-48D6-988B-2EB44521B55D}"/>
+          </ac:cxnSpMkLst>
+        </pc:cxnChg>
+        <pc:cxnChg chg="add mod">
+          <ac:chgData name="MORLEY, Thomas" userId="ca0a1631-feee-46f8-9dc6-a0f397eff84f" providerId="ADAL" clId="{E34FB9E7-6CF7-40FD-83B9-B94EF404FC33}" dt="2021-11-02T15:27:38.704" v="3261" actId="14100"/>
+          <ac:cxnSpMkLst>
+            <pc:docMk/>
+            <pc:sldMk cId="2423129868" sldId="266"/>
+            <ac:cxnSpMk id="29" creationId="{D7AF10CB-732D-4E41-AD04-B80E5F96C349}"/>
           </ac:cxnSpMkLst>
         </pc:cxnChg>
       </pc:sldChg>
@@ -1542,7 +1717,7 @@
           <a:p>
             <a:fld id="{565E3272-2692-4CBA-BB89-AE4B7AF62778}" type="datetimeFigureOut">
               <a:rPr lang="en-GB" smtClean="0"/>
-              <a:t>26/10/2021</a:t>
+              <a:t>02/11/2021</a:t>
             </a:fld>
             <a:endParaRPr lang="en-GB"/>
           </a:p>
@@ -1742,7 +1917,7 @@
           <a:p>
             <a:fld id="{565E3272-2692-4CBA-BB89-AE4B7AF62778}" type="datetimeFigureOut">
               <a:rPr lang="en-GB" smtClean="0"/>
-              <a:t>26/10/2021</a:t>
+              <a:t>02/11/2021</a:t>
             </a:fld>
             <a:endParaRPr lang="en-GB"/>
           </a:p>
@@ -1952,7 +2127,7 @@
           <a:p>
             <a:fld id="{565E3272-2692-4CBA-BB89-AE4B7AF62778}" type="datetimeFigureOut">
               <a:rPr lang="en-GB" smtClean="0"/>
-              <a:t>26/10/2021</a:t>
+              <a:t>02/11/2021</a:t>
             </a:fld>
             <a:endParaRPr lang="en-GB"/>
           </a:p>
@@ -2152,7 +2327,7 @@
           <a:p>
             <a:fld id="{565E3272-2692-4CBA-BB89-AE4B7AF62778}" type="datetimeFigureOut">
               <a:rPr lang="en-GB" smtClean="0"/>
-              <a:t>26/10/2021</a:t>
+              <a:t>02/11/2021</a:t>
             </a:fld>
             <a:endParaRPr lang="en-GB"/>
           </a:p>
@@ -2428,7 +2603,7 @@
           <a:p>
             <a:fld id="{565E3272-2692-4CBA-BB89-AE4B7AF62778}" type="datetimeFigureOut">
               <a:rPr lang="en-GB" smtClean="0"/>
-              <a:t>26/10/2021</a:t>
+              <a:t>02/11/2021</a:t>
             </a:fld>
             <a:endParaRPr lang="en-GB"/>
           </a:p>
@@ -2696,7 +2871,7 @@
           <a:p>
             <a:fld id="{565E3272-2692-4CBA-BB89-AE4B7AF62778}" type="datetimeFigureOut">
               <a:rPr lang="en-GB" smtClean="0"/>
-              <a:t>26/10/2021</a:t>
+              <a:t>02/11/2021</a:t>
             </a:fld>
             <a:endParaRPr lang="en-GB"/>
           </a:p>
@@ -3111,7 +3286,7 @@
           <a:p>
             <a:fld id="{565E3272-2692-4CBA-BB89-AE4B7AF62778}" type="datetimeFigureOut">
               <a:rPr lang="en-GB" smtClean="0"/>
-              <a:t>26/10/2021</a:t>
+              <a:t>02/11/2021</a:t>
             </a:fld>
             <a:endParaRPr lang="en-GB"/>
           </a:p>
@@ -3253,7 +3428,7 @@
           <a:p>
             <a:fld id="{565E3272-2692-4CBA-BB89-AE4B7AF62778}" type="datetimeFigureOut">
               <a:rPr lang="en-GB" smtClean="0"/>
-              <a:t>26/10/2021</a:t>
+              <a:t>02/11/2021</a:t>
             </a:fld>
             <a:endParaRPr lang="en-GB"/>
           </a:p>
@@ -3366,7 +3541,7 @@
           <a:p>
             <a:fld id="{565E3272-2692-4CBA-BB89-AE4B7AF62778}" type="datetimeFigureOut">
               <a:rPr lang="en-GB" smtClean="0"/>
-              <a:t>26/10/2021</a:t>
+              <a:t>02/11/2021</a:t>
             </a:fld>
             <a:endParaRPr lang="en-GB"/>
           </a:p>
@@ -3679,7 +3854,7 @@
           <a:p>
             <a:fld id="{565E3272-2692-4CBA-BB89-AE4B7AF62778}" type="datetimeFigureOut">
               <a:rPr lang="en-GB" smtClean="0"/>
-              <a:t>26/10/2021</a:t>
+              <a:t>02/11/2021</a:t>
             </a:fld>
             <a:endParaRPr lang="en-GB"/>
           </a:p>
@@ -3968,7 +4143,7 @@
           <a:p>
             <a:fld id="{565E3272-2692-4CBA-BB89-AE4B7AF62778}" type="datetimeFigureOut">
               <a:rPr lang="en-GB" smtClean="0"/>
-              <a:t>26/10/2021</a:t>
+              <a:t>02/11/2021</a:t>
             </a:fld>
             <a:endParaRPr lang="en-GB"/>
           </a:p>
@@ -4211,7 +4386,7 @@
           <a:p>
             <a:fld id="{565E3272-2692-4CBA-BB89-AE4B7AF62778}" type="datetimeFigureOut">
               <a:rPr lang="en-GB" smtClean="0"/>
-              <a:t>26/10/2021</a:t>
+              <a:t>02/11/2021</a:t>
             </a:fld>
             <a:endParaRPr lang="en-GB"/>
           </a:p>
@@ -4688,6 +4863,1128 @@
     <p:extLst>
       <p:ext uri="{BB962C8B-B14F-4D97-AF65-F5344CB8AC3E}">
         <p14:creationId xmlns:p14="http://schemas.microsoft.com/office/powerpoint/2010/main" val="1102869079"/>
+      </p:ext>
+    </p:extLst>
+  </p:cSld>
+  <p:clrMapOvr>
+    <a:masterClrMapping/>
+  </p:clrMapOvr>
+</p:sld>
+</file>
+
+<file path=ppt/slides/slide10.xml><?xml version="1.0" encoding="utf-8"?>
+<p:sld xmlns:a="http://schemas.openxmlformats.org/drawingml/2006/main" xmlns:r="http://schemas.openxmlformats.org/officeDocument/2006/relationships" xmlns:p="http://schemas.openxmlformats.org/presentationml/2006/main">
+  <p:cSld>
+    <p:spTree>
+      <p:nvGrpSpPr>
+        <p:cNvPr id="1" name=""/>
+        <p:cNvGrpSpPr/>
+        <p:nvPr/>
+      </p:nvGrpSpPr>
+      <p:grpSpPr>
+        <a:xfrm>
+          <a:off x="0" y="0"/>
+          <a:ext cx="0" cy="0"/>
+          <a:chOff x="0" y="0"/>
+          <a:chExt cx="0" cy="0"/>
+        </a:xfrm>
+      </p:grpSpPr>
+      <p:sp>
+        <p:nvSpPr>
+          <p:cNvPr id="2" name="Title 1">
+            <a:extLst>
+              <a:ext uri="{FF2B5EF4-FFF2-40B4-BE49-F238E27FC236}">
+                <a16:creationId xmlns:a16="http://schemas.microsoft.com/office/drawing/2014/main" id="{5F6791CC-7E1C-4898-8970-C8784B749EC0}"/>
+              </a:ext>
+            </a:extLst>
+          </p:cNvPr>
+          <p:cNvSpPr>
+            <a:spLocks noGrp="1"/>
+          </p:cNvSpPr>
+          <p:nvPr>
+            <p:ph type="title"/>
+          </p:nvPr>
+        </p:nvSpPr>
+        <p:spPr/>
+        <p:txBody>
+          <a:bodyPr/>
+          <a:lstStyle/>
+          <a:p>
+            <a:r>
+              <a:rPr lang="en-GB" dirty="0"/>
+              <a:t>Saving score function</a:t>
+            </a:r>
+          </a:p>
+        </p:txBody>
+      </p:sp>
+      <p:sp>
+        <p:nvSpPr>
+          <p:cNvPr id="3" name="Content Placeholder 2">
+            <a:extLst>
+              <a:ext uri="{FF2B5EF4-FFF2-40B4-BE49-F238E27FC236}">
+                <a16:creationId xmlns:a16="http://schemas.microsoft.com/office/drawing/2014/main" id="{04D1F5BF-9556-4373-A58D-CC26AF09C5AE}"/>
+              </a:ext>
+            </a:extLst>
+          </p:cNvPr>
+          <p:cNvSpPr txBox="1">
+            <a:spLocks/>
+          </p:cNvSpPr>
+          <p:nvPr/>
+        </p:nvSpPr>
+        <p:spPr>
+          <a:xfrm>
+            <a:off x="838200" y="1625327"/>
+            <a:ext cx="10515600" cy="636786"/>
+          </a:xfrm>
+          <a:prstGeom prst="rect">
+            <a:avLst/>
+          </a:prstGeom>
+        </p:spPr>
+        <p:txBody>
+          <a:bodyPr>
+            <a:normAutofit lnSpcReduction="10000"/>
+          </a:bodyPr>
+          <a:lstStyle>
+            <a:lvl1pPr marL="228600" indent="-228600" algn="l" defTabSz="914400" rtl="0" eaLnBrk="1" latinLnBrk="0" hangingPunct="1">
+              <a:lnSpc>
+                <a:spcPct val="90000"/>
+              </a:lnSpc>
+              <a:spcBef>
+                <a:spcPts val="1000"/>
+              </a:spcBef>
+              <a:buFont typeface="Arial" panose="020B0604020202020204" pitchFamily="34" charset="0"/>
+              <a:buChar char="•"/>
+              <a:defRPr sz="2800" kern="1200">
+                <a:solidFill>
+                  <a:schemeClr val="tx1"/>
+                </a:solidFill>
+                <a:latin typeface="+mn-lt"/>
+                <a:ea typeface="+mn-ea"/>
+                <a:cs typeface="+mn-cs"/>
+              </a:defRPr>
+            </a:lvl1pPr>
+            <a:lvl2pPr marL="685800" indent="-228600" algn="l" defTabSz="914400" rtl="0" eaLnBrk="1" latinLnBrk="0" hangingPunct="1">
+              <a:lnSpc>
+                <a:spcPct val="90000"/>
+              </a:lnSpc>
+              <a:spcBef>
+                <a:spcPts val="500"/>
+              </a:spcBef>
+              <a:buFont typeface="Arial" panose="020B0604020202020204" pitchFamily="34" charset="0"/>
+              <a:buChar char="•"/>
+              <a:defRPr sz="2400" kern="1200">
+                <a:solidFill>
+                  <a:schemeClr val="tx1"/>
+                </a:solidFill>
+                <a:latin typeface="+mn-lt"/>
+                <a:ea typeface="+mn-ea"/>
+                <a:cs typeface="+mn-cs"/>
+              </a:defRPr>
+            </a:lvl2pPr>
+            <a:lvl3pPr marL="1143000" indent="-228600" algn="l" defTabSz="914400" rtl="0" eaLnBrk="1" latinLnBrk="0" hangingPunct="1">
+              <a:lnSpc>
+                <a:spcPct val="90000"/>
+              </a:lnSpc>
+              <a:spcBef>
+                <a:spcPts val="500"/>
+              </a:spcBef>
+              <a:buFont typeface="Arial" panose="020B0604020202020204" pitchFamily="34" charset="0"/>
+              <a:buChar char="•"/>
+              <a:defRPr sz="2000" kern="1200">
+                <a:solidFill>
+                  <a:schemeClr val="tx1"/>
+                </a:solidFill>
+                <a:latin typeface="+mn-lt"/>
+                <a:ea typeface="+mn-ea"/>
+                <a:cs typeface="+mn-cs"/>
+              </a:defRPr>
+            </a:lvl3pPr>
+            <a:lvl4pPr marL="1600200" indent="-228600" algn="l" defTabSz="914400" rtl="0" eaLnBrk="1" latinLnBrk="0" hangingPunct="1">
+              <a:lnSpc>
+                <a:spcPct val="90000"/>
+              </a:lnSpc>
+              <a:spcBef>
+                <a:spcPts val="500"/>
+              </a:spcBef>
+              <a:buFont typeface="Arial" panose="020B0604020202020204" pitchFamily="34" charset="0"/>
+              <a:buChar char="•"/>
+              <a:defRPr sz="1800" kern="1200">
+                <a:solidFill>
+                  <a:schemeClr val="tx1"/>
+                </a:solidFill>
+                <a:latin typeface="+mn-lt"/>
+                <a:ea typeface="+mn-ea"/>
+                <a:cs typeface="+mn-cs"/>
+              </a:defRPr>
+            </a:lvl4pPr>
+            <a:lvl5pPr marL="2057400" indent="-228600" algn="l" defTabSz="914400" rtl="0" eaLnBrk="1" latinLnBrk="0" hangingPunct="1">
+              <a:lnSpc>
+                <a:spcPct val="90000"/>
+              </a:lnSpc>
+              <a:spcBef>
+                <a:spcPts val="500"/>
+              </a:spcBef>
+              <a:buFont typeface="Arial" panose="020B0604020202020204" pitchFamily="34" charset="0"/>
+              <a:buChar char="•"/>
+              <a:defRPr sz="1800" kern="1200">
+                <a:solidFill>
+                  <a:schemeClr val="tx1"/>
+                </a:solidFill>
+                <a:latin typeface="+mn-lt"/>
+                <a:ea typeface="+mn-ea"/>
+                <a:cs typeface="+mn-cs"/>
+              </a:defRPr>
+            </a:lvl5pPr>
+            <a:lvl6pPr marL="2514600" indent="-228600" algn="l" defTabSz="914400" rtl="0" eaLnBrk="1" latinLnBrk="0" hangingPunct="1">
+              <a:lnSpc>
+                <a:spcPct val="90000"/>
+              </a:lnSpc>
+              <a:spcBef>
+                <a:spcPts val="500"/>
+              </a:spcBef>
+              <a:buFont typeface="Arial" panose="020B0604020202020204" pitchFamily="34" charset="0"/>
+              <a:buChar char="•"/>
+              <a:defRPr sz="1800" kern="1200">
+                <a:solidFill>
+                  <a:schemeClr val="tx1"/>
+                </a:solidFill>
+                <a:latin typeface="+mn-lt"/>
+                <a:ea typeface="+mn-ea"/>
+                <a:cs typeface="+mn-cs"/>
+              </a:defRPr>
+            </a:lvl6pPr>
+            <a:lvl7pPr marL="2971800" indent="-228600" algn="l" defTabSz="914400" rtl="0" eaLnBrk="1" latinLnBrk="0" hangingPunct="1">
+              <a:lnSpc>
+                <a:spcPct val="90000"/>
+              </a:lnSpc>
+              <a:spcBef>
+                <a:spcPts val="500"/>
+              </a:spcBef>
+              <a:buFont typeface="Arial" panose="020B0604020202020204" pitchFamily="34" charset="0"/>
+              <a:buChar char="•"/>
+              <a:defRPr sz="1800" kern="1200">
+                <a:solidFill>
+                  <a:schemeClr val="tx1"/>
+                </a:solidFill>
+                <a:latin typeface="+mn-lt"/>
+                <a:ea typeface="+mn-ea"/>
+                <a:cs typeface="+mn-cs"/>
+              </a:defRPr>
+            </a:lvl7pPr>
+            <a:lvl8pPr marL="3429000" indent="-228600" algn="l" defTabSz="914400" rtl="0" eaLnBrk="1" latinLnBrk="0" hangingPunct="1">
+              <a:lnSpc>
+                <a:spcPct val="90000"/>
+              </a:lnSpc>
+              <a:spcBef>
+                <a:spcPts val="500"/>
+              </a:spcBef>
+              <a:buFont typeface="Arial" panose="020B0604020202020204" pitchFamily="34" charset="0"/>
+              <a:buChar char="•"/>
+              <a:defRPr sz="1800" kern="1200">
+                <a:solidFill>
+                  <a:schemeClr val="tx1"/>
+                </a:solidFill>
+                <a:latin typeface="+mn-lt"/>
+                <a:ea typeface="+mn-ea"/>
+                <a:cs typeface="+mn-cs"/>
+              </a:defRPr>
+            </a:lvl8pPr>
+            <a:lvl9pPr marL="3886200" indent="-228600" algn="l" defTabSz="914400" rtl="0" eaLnBrk="1" latinLnBrk="0" hangingPunct="1">
+              <a:lnSpc>
+                <a:spcPct val="90000"/>
+              </a:lnSpc>
+              <a:spcBef>
+                <a:spcPts val="500"/>
+              </a:spcBef>
+              <a:buFont typeface="Arial" panose="020B0604020202020204" pitchFamily="34" charset="0"/>
+              <a:buChar char="•"/>
+              <a:defRPr sz="1800" kern="1200">
+                <a:solidFill>
+                  <a:schemeClr val="tx1"/>
+                </a:solidFill>
+                <a:latin typeface="+mn-lt"/>
+                <a:ea typeface="+mn-ea"/>
+                <a:cs typeface="+mn-cs"/>
+              </a:defRPr>
+            </a:lvl9pPr>
+          </a:lstStyle>
+          <a:p>
+            <a:pPr marL="0" indent="0">
+              <a:buFont typeface="Arial" panose="020B0604020202020204" pitchFamily="34" charset="0"/>
+              <a:buNone/>
+            </a:pPr>
+            <a:r>
+              <a:rPr lang="en-GB" sz="2000" dirty="0"/>
+              <a:t>This is to save scores for different QA checks to SQL. We read in current SQL data, and current app data.</a:t>
+            </a:r>
+          </a:p>
+        </p:txBody>
+      </p:sp>
+      <p:sp>
+        <p:nvSpPr>
+          <p:cNvPr id="4" name="TextBox 3">
+            <a:extLst>
+              <a:ext uri="{FF2B5EF4-FFF2-40B4-BE49-F238E27FC236}">
+                <a16:creationId xmlns:a16="http://schemas.microsoft.com/office/drawing/2014/main" id="{E192288E-89BA-4402-894D-3D715A3EA78D}"/>
+              </a:ext>
+            </a:extLst>
+          </p:cNvPr>
+          <p:cNvSpPr txBox="1"/>
+          <p:nvPr/>
+        </p:nvSpPr>
+        <p:spPr>
+          <a:xfrm>
+            <a:off x="1075508" y="4249783"/>
+            <a:ext cx="1878912" cy="369332"/>
+          </a:xfrm>
+          <a:prstGeom prst="rect">
+            <a:avLst/>
+          </a:prstGeom>
+          <a:solidFill>
+            <a:schemeClr val="accent1">
+              <a:lumMod val="20000"/>
+              <a:lumOff val="80000"/>
+            </a:schemeClr>
+          </a:solidFill>
+        </p:spPr>
+        <p:style>
+          <a:lnRef idx="1">
+            <a:schemeClr val="accent1"/>
+          </a:lnRef>
+          <a:fillRef idx="2">
+            <a:schemeClr val="accent1"/>
+          </a:fillRef>
+          <a:effectRef idx="1">
+            <a:schemeClr val="accent1"/>
+          </a:effectRef>
+          <a:fontRef idx="minor">
+            <a:schemeClr val="dk1"/>
+          </a:fontRef>
+        </p:style>
+        <p:txBody>
+          <a:bodyPr wrap="none" rtlCol="0">
+            <a:spAutoFit/>
+          </a:bodyPr>
+          <a:lstStyle/>
+          <a:p>
+            <a:r>
+              <a:rPr lang="en-GB" dirty="0"/>
+              <a:t>Is app data blank?</a:t>
+            </a:r>
+          </a:p>
+        </p:txBody>
+      </p:sp>
+      <p:sp>
+        <p:nvSpPr>
+          <p:cNvPr id="5" name="TextBox 4">
+            <a:extLst>
+              <a:ext uri="{FF2B5EF4-FFF2-40B4-BE49-F238E27FC236}">
+                <a16:creationId xmlns:a16="http://schemas.microsoft.com/office/drawing/2014/main" id="{CEC9B9B1-316C-4739-B075-AE5E33052E66}"/>
+              </a:ext>
+            </a:extLst>
+          </p:cNvPr>
+          <p:cNvSpPr txBox="1"/>
+          <p:nvPr/>
+        </p:nvSpPr>
+        <p:spPr>
+          <a:xfrm>
+            <a:off x="1010194" y="2349528"/>
+            <a:ext cx="2009541" cy="923330"/>
+          </a:xfrm>
+          <a:prstGeom prst="rect">
+            <a:avLst/>
+          </a:prstGeom>
+          <a:solidFill>
+            <a:schemeClr val="accent1">
+              <a:lumMod val="20000"/>
+              <a:lumOff val="80000"/>
+            </a:schemeClr>
+          </a:solidFill>
+        </p:spPr>
+        <p:style>
+          <a:lnRef idx="1">
+            <a:schemeClr val="accent1"/>
+          </a:lnRef>
+          <a:fillRef idx="2">
+            <a:schemeClr val="accent1"/>
+          </a:fillRef>
+          <a:effectRef idx="1">
+            <a:schemeClr val="accent1"/>
+          </a:effectRef>
+          <a:fontRef idx="minor">
+            <a:schemeClr val="dk1"/>
+          </a:fontRef>
+        </p:style>
+        <p:txBody>
+          <a:bodyPr wrap="square" rtlCol="0">
+            <a:spAutoFit/>
+          </a:bodyPr>
+          <a:lstStyle/>
+          <a:p>
+            <a:pPr algn="ctr"/>
+            <a:r>
+              <a:rPr lang="en-GB" dirty="0"/>
+              <a:t>Does row for corresponding SQL data exist?</a:t>
+            </a:r>
+          </a:p>
+        </p:txBody>
+      </p:sp>
+      <p:cxnSp>
+        <p:nvCxnSpPr>
+          <p:cNvPr id="7" name="Straight Arrow Connector 6">
+            <a:extLst>
+              <a:ext uri="{FF2B5EF4-FFF2-40B4-BE49-F238E27FC236}">
+                <a16:creationId xmlns:a16="http://schemas.microsoft.com/office/drawing/2014/main" id="{A468A3A8-41C9-4C16-9A1E-F7B181A2CF57}"/>
+              </a:ext>
+            </a:extLst>
+          </p:cNvPr>
+          <p:cNvCxnSpPr>
+            <a:stCxn id="5" idx="2"/>
+          </p:cNvCxnSpPr>
+          <p:nvPr/>
+        </p:nvCxnSpPr>
+        <p:spPr>
+          <a:xfrm flipH="1">
+            <a:off x="2002971" y="3272858"/>
+            <a:ext cx="11994" cy="976925"/>
+          </a:xfrm>
+          <a:prstGeom prst="straightConnector1">
+            <a:avLst/>
+          </a:prstGeom>
+          <a:ln>
+            <a:tailEnd type="triangle"/>
+          </a:ln>
+        </p:spPr>
+        <p:style>
+          <a:lnRef idx="1">
+            <a:schemeClr val="accent1"/>
+          </a:lnRef>
+          <a:fillRef idx="0">
+            <a:schemeClr val="accent1"/>
+          </a:fillRef>
+          <a:effectRef idx="0">
+            <a:schemeClr val="accent1"/>
+          </a:effectRef>
+          <a:fontRef idx="minor">
+            <a:schemeClr val="tx1"/>
+          </a:fontRef>
+        </p:style>
+      </p:cxnSp>
+      <p:sp>
+        <p:nvSpPr>
+          <p:cNvPr id="8" name="TextBox 7">
+            <a:extLst>
+              <a:ext uri="{FF2B5EF4-FFF2-40B4-BE49-F238E27FC236}">
+                <a16:creationId xmlns:a16="http://schemas.microsoft.com/office/drawing/2014/main" id="{F40629F5-4082-49A1-ADD2-1390B4D36469}"/>
+              </a:ext>
+            </a:extLst>
+          </p:cNvPr>
+          <p:cNvSpPr txBox="1"/>
+          <p:nvPr/>
+        </p:nvSpPr>
+        <p:spPr>
+          <a:xfrm>
+            <a:off x="2002971" y="3489045"/>
+            <a:ext cx="455574" cy="369332"/>
+          </a:xfrm>
+          <a:prstGeom prst="rect">
+            <a:avLst/>
+          </a:prstGeom>
+          <a:noFill/>
+        </p:spPr>
+        <p:txBody>
+          <a:bodyPr wrap="none" rtlCol="0">
+            <a:spAutoFit/>
+          </a:bodyPr>
+          <a:lstStyle/>
+          <a:p>
+            <a:r>
+              <a:rPr lang="en-GB" dirty="0"/>
+              <a:t>No</a:t>
+            </a:r>
+          </a:p>
+        </p:txBody>
+      </p:sp>
+      <p:cxnSp>
+        <p:nvCxnSpPr>
+          <p:cNvPr id="10" name="Straight Arrow Connector 9">
+            <a:extLst>
+              <a:ext uri="{FF2B5EF4-FFF2-40B4-BE49-F238E27FC236}">
+                <a16:creationId xmlns:a16="http://schemas.microsoft.com/office/drawing/2014/main" id="{A0EC1407-84AC-432C-B085-BDCF8F9F58FA}"/>
+              </a:ext>
+            </a:extLst>
+          </p:cNvPr>
+          <p:cNvCxnSpPr>
+            <a:stCxn id="4" idx="2"/>
+          </p:cNvCxnSpPr>
+          <p:nvPr/>
+        </p:nvCxnSpPr>
+        <p:spPr>
+          <a:xfrm>
+            <a:off x="2014964" y="4619115"/>
+            <a:ext cx="0" cy="815034"/>
+          </a:xfrm>
+          <a:prstGeom prst="straightConnector1">
+            <a:avLst/>
+          </a:prstGeom>
+          <a:ln>
+            <a:tailEnd type="triangle"/>
+          </a:ln>
+        </p:spPr>
+        <p:style>
+          <a:lnRef idx="1">
+            <a:schemeClr val="accent1"/>
+          </a:lnRef>
+          <a:fillRef idx="0">
+            <a:schemeClr val="accent1"/>
+          </a:fillRef>
+          <a:effectRef idx="0">
+            <a:schemeClr val="accent1"/>
+          </a:effectRef>
+          <a:fontRef idx="minor">
+            <a:schemeClr val="tx1"/>
+          </a:fontRef>
+        </p:style>
+      </p:cxnSp>
+      <p:sp>
+        <p:nvSpPr>
+          <p:cNvPr id="11" name="TextBox 10">
+            <a:extLst>
+              <a:ext uri="{FF2B5EF4-FFF2-40B4-BE49-F238E27FC236}">
+                <a16:creationId xmlns:a16="http://schemas.microsoft.com/office/drawing/2014/main" id="{E336B898-A9BE-472B-A817-77DE50F417E8}"/>
+              </a:ext>
+            </a:extLst>
+          </p:cNvPr>
+          <p:cNvSpPr txBox="1"/>
+          <p:nvPr/>
+        </p:nvSpPr>
+        <p:spPr>
+          <a:xfrm>
+            <a:off x="2002971" y="4821363"/>
+            <a:ext cx="455574" cy="369332"/>
+          </a:xfrm>
+          <a:prstGeom prst="rect">
+            <a:avLst/>
+          </a:prstGeom>
+          <a:noFill/>
+        </p:spPr>
+        <p:txBody>
+          <a:bodyPr wrap="none" rtlCol="0">
+            <a:spAutoFit/>
+          </a:bodyPr>
+          <a:lstStyle/>
+          <a:p>
+            <a:r>
+              <a:rPr lang="en-GB" dirty="0"/>
+              <a:t>No</a:t>
+            </a:r>
+          </a:p>
+        </p:txBody>
+      </p:sp>
+      <p:sp>
+        <p:nvSpPr>
+          <p:cNvPr id="12" name="TextBox 11">
+            <a:extLst>
+              <a:ext uri="{FF2B5EF4-FFF2-40B4-BE49-F238E27FC236}">
+                <a16:creationId xmlns:a16="http://schemas.microsoft.com/office/drawing/2014/main" id="{4B040FD5-B036-49C4-93AD-C1BD3F282008}"/>
+              </a:ext>
+            </a:extLst>
+          </p:cNvPr>
+          <p:cNvSpPr txBox="1"/>
+          <p:nvPr/>
+        </p:nvSpPr>
+        <p:spPr>
+          <a:xfrm>
+            <a:off x="1075508" y="5434149"/>
+            <a:ext cx="3219023" cy="646331"/>
+          </a:xfrm>
+          <a:prstGeom prst="rect">
+            <a:avLst/>
+          </a:prstGeom>
+          <a:solidFill>
+            <a:schemeClr val="accent6">
+              <a:lumMod val="20000"/>
+              <a:lumOff val="80000"/>
+            </a:schemeClr>
+          </a:solidFill>
+        </p:spPr>
+        <p:style>
+          <a:lnRef idx="1">
+            <a:schemeClr val="accent1"/>
+          </a:lnRef>
+          <a:fillRef idx="2">
+            <a:schemeClr val="accent1"/>
+          </a:fillRef>
+          <a:effectRef idx="1">
+            <a:schemeClr val="accent1"/>
+          </a:effectRef>
+          <a:fontRef idx="minor">
+            <a:schemeClr val="dk1"/>
+          </a:fontRef>
+        </p:style>
+        <p:txBody>
+          <a:bodyPr wrap="none" rtlCol="0">
+            <a:spAutoFit/>
+          </a:bodyPr>
+          <a:lstStyle/>
+          <a:p>
+            <a:r>
+              <a:rPr lang="en-GB" dirty="0"/>
+              <a:t>This is new data.</a:t>
+            </a:r>
+          </a:p>
+          <a:p>
+            <a:r>
+              <a:rPr lang="en-GB" dirty="0"/>
+              <a:t>Add a new row to SQL database.</a:t>
+            </a:r>
+          </a:p>
+        </p:txBody>
+      </p:sp>
+      <p:cxnSp>
+        <p:nvCxnSpPr>
+          <p:cNvPr id="13" name="Straight Arrow Connector 12">
+            <a:extLst>
+              <a:ext uri="{FF2B5EF4-FFF2-40B4-BE49-F238E27FC236}">
+                <a16:creationId xmlns:a16="http://schemas.microsoft.com/office/drawing/2014/main" id="{7A6CB8DD-5546-4608-9D08-BF96C56D2774}"/>
+              </a:ext>
+            </a:extLst>
+          </p:cNvPr>
+          <p:cNvCxnSpPr>
+            <a:cxnSpLocks/>
+            <a:stCxn id="5" idx="3"/>
+            <a:endCxn id="16" idx="1"/>
+          </p:cNvCxnSpPr>
+          <p:nvPr/>
+        </p:nvCxnSpPr>
+        <p:spPr>
+          <a:xfrm>
+            <a:off x="3019735" y="2811193"/>
+            <a:ext cx="2743369" cy="5563"/>
+          </a:xfrm>
+          <a:prstGeom prst="straightConnector1">
+            <a:avLst/>
+          </a:prstGeom>
+          <a:ln>
+            <a:tailEnd type="triangle"/>
+          </a:ln>
+        </p:spPr>
+        <p:style>
+          <a:lnRef idx="1">
+            <a:schemeClr val="accent1"/>
+          </a:lnRef>
+          <a:fillRef idx="0">
+            <a:schemeClr val="accent1"/>
+          </a:fillRef>
+          <a:effectRef idx="0">
+            <a:schemeClr val="accent1"/>
+          </a:effectRef>
+          <a:fontRef idx="minor">
+            <a:schemeClr val="tx1"/>
+          </a:fontRef>
+        </p:style>
+      </p:cxnSp>
+      <p:sp>
+        <p:nvSpPr>
+          <p:cNvPr id="15" name="TextBox 14">
+            <a:extLst>
+              <a:ext uri="{FF2B5EF4-FFF2-40B4-BE49-F238E27FC236}">
+                <a16:creationId xmlns:a16="http://schemas.microsoft.com/office/drawing/2014/main" id="{476C8284-E34B-45AA-BB7B-7C99A398B3CF}"/>
+              </a:ext>
+            </a:extLst>
+          </p:cNvPr>
+          <p:cNvSpPr txBox="1"/>
+          <p:nvPr/>
+        </p:nvSpPr>
+        <p:spPr>
+          <a:xfrm>
+            <a:off x="3942548" y="2493590"/>
+            <a:ext cx="485518" cy="369332"/>
+          </a:xfrm>
+          <a:prstGeom prst="rect">
+            <a:avLst/>
+          </a:prstGeom>
+          <a:noFill/>
+        </p:spPr>
+        <p:txBody>
+          <a:bodyPr wrap="none" rtlCol="0">
+            <a:spAutoFit/>
+          </a:bodyPr>
+          <a:lstStyle/>
+          <a:p>
+            <a:r>
+              <a:rPr lang="en-GB" dirty="0"/>
+              <a:t>Yes</a:t>
+            </a:r>
+          </a:p>
+        </p:txBody>
+      </p:sp>
+      <p:sp>
+        <p:nvSpPr>
+          <p:cNvPr id="16" name="TextBox 15">
+            <a:extLst>
+              <a:ext uri="{FF2B5EF4-FFF2-40B4-BE49-F238E27FC236}">
+                <a16:creationId xmlns:a16="http://schemas.microsoft.com/office/drawing/2014/main" id="{BDF9E54E-C4AD-4ADE-9789-9146DF7DA9EB}"/>
+              </a:ext>
+            </a:extLst>
+          </p:cNvPr>
+          <p:cNvSpPr txBox="1"/>
+          <p:nvPr/>
+        </p:nvSpPr>
+        <p:spPr>
+          <a:xfrm>
+            <a:off x="5763104" y="2493590"/>
+            <a:ext cx="2009541" cy="646331"/>
+          </a:xfrm>
+          <a:prstGeom prst="rect">
+            <a:avLst/>
+          </a:prstGeom>
+          <a:solidFill>
+            <a:schemeClr val="accent1">
+              <a:lumMod val="20000"/>
+              <a:lumOff val="80000"/>
+            </a:schemeClr>
+          </a:solidFill>
+        </p:spPr>
+        <p:style>
+          <a:lnRef idx="1">
+            <a:schemeClr val="accent1"/>
+          </a:lnRef>
+          <a:fillRef idx="2">
+            <a:schemeClr val="accent1"/>
+          </a:fillRef>
+          <a:effectRef idx="1">
+            <a:schemeClr val="accent1"/>
+          </a:effectRef>
+          <a:fontRef idx="minor">
+            <a:schemeClr val="dk1"/>
+          </a:fontRef>
+        </p:style>
+        <p:txBody>
+          <a:bodyPr wrap="square" rtlCol="0">
+            <a:spAutoFit/>
+          </a:bodyPr>
+          <a:lstStyle/>
+          <a:p>
+            <a:pPr algn="ctr"/>
+            <a:r>
+              <a:rPr lang="en-GB" dirty="0"/>
+              <a:t>Is app data equal to SQL data?</a:t>
+            </a:r>
+          </a:p>
+        </p:txBody>
+      </p:sp>
+      <p:sp>
+        <p:nvSpPr>
+          <p:cNvPr id="17" name="TextBox 16">
+            <a:extLst>
+              <a:ext uri="{FF2B5EF4-FFF2-40B4-BE49-F238E27FC236}">
+                <a16:creationId xmlns:a16="http://schemas.microsoft.com/office/drawing/2014/main" id="{71524C64-9D91-4785-8931-4E43D9A8D27C}"/>
+              </a:ext>
+            </a:extLst>
+          </p:cNvPr>
+          <p:cNvSpPr txBox="1"/>
+          <p:nvPr/>
+        </p:nvSpPr>
+        <p:spPr>
+          <a:xfrm>
+            <a:off x="3030582" y="4052756"/>
+            <a:ext cx="485518" cy="369332"/>
+          </a:xfrm>
+          <a:prstGeom prst="rect">
+            <a:avLst/>
+          </a:prstGeom>
+          <a:noFill/>
+        </p:spPr>
+        <p:txBody>
+          <a:bodyPr wrap="none" rtlCol="0">
+            <a:spAutoFit/>
+          </a:bodyPr>
+          <a:lstStyle/>
+          <a:p>
+            <a:r>
+              <a:rPr lang="en-GB" dirty="0"/>
+              <a:t>Yes</a:t>
+            </a:r>
+          </a:p>
+        </p:txBody>
+      </p:sp>
+      <p:cxnSp>
+        <p:nvCxnSpPr>
+          <p:cNvPr id="18" name="Straight Arrow Connector 17">
+            <a:extLst>
+              <a:ext uri="{FF2B5EF4-FFF2-40B4-BE49-F238E27FC236}">
+                <a16:creationId xmlns:a16="http://schemas.microsoft.com/office/drawing/2014/main" id="{43DCDBD7-DA70-4B5F-BA1E-AA4B8AD423D0}"/>
+              </a:ext>
+            </a:extLst>
+          </p:cNvPr>
+          <p:cNvCxnSpPr>
+            <a:cxnSpLocks/>
+          </p:cNvCxnSpPr>
+          <p:nvPr/>
+        </p:nvCxnSpPr>
+        <p:spPr>
+          <a:xfrm>
+            <a:off x="2948527" y="4434449"/>
+            <a:ext cx="643288" cy="3848"/>
+          </a:xfrm>
+          <a:prstGeom prst="straightConnector1">
+            <a:avLst/>
+          </a:prstGeom>
+          <a:ln>
+            <a:tailEnd type="triangle"/>
+          </a:ln>
+        </p:spPr>
+        <p:style>
+          <a:lnRef idx="1">
+            <a:schemeClr val="accent1"/>
+          </a:lnRef>
+          <a:fillRef idx="0">
+            <a:schemeClr val="accent1"/>
+          </a:fillRef>
+          <a:effectRef idx="0">
+            <a:schemeClr val="accent1"/>
+          </a:effectRef>
+          <a:fontRef idx="minor">
+            <a:schemeClr val="tx1"/>
+          </a:fontRef>
+        </p:style>
+      </p:cxnSp>
+      <p:sp>
+        <p:nvSpPr>
+          <p:cNvPr id="19" name="TextBox 18">
+            <a:extLst>
+              <a:ext uri="{FF2B5EF4-FFF2-40B4-BE49-F238E27FC236}">
+                <a16:creationId xmlns:a16="http://schemas.microsoft.com/office/drawing/2014/main" id="{A1FC2A3D-67EC-446A-8360-3E69D0E7D2AF}"/>
+              </a:ext>
+            </a:extLst>
+          </p:cNvPr>
+          <p:cNvSpPr txBox="1"/>
+          <p:nvPr/>
+        </p:nvSpPr>
+        <p:spPr>
+          <a:xfrm>
+            <a:off x="3611104" y="4069758"/>
+            <a:ext cx="2009541" cy="923330"/>
+          </a:xfrm>
+          <a:prstGeom prst="rect">
+            <a:avLst/>
+          </a:prstGeom>
+          <a:solidFill>
+            <a:schemeClr val="accent2">
+              <a:lumMod val="40000"/>
+              <a:lumOff val="60000"/>
+            </a:schemeClr>
+          </a:solidFill>
+        </p:spPr>
+        <p:style>
+          <a:lnRef idx="1">
+            <a:schemeClr val="accent1"/>
+          </a:lnRef>
+          <a:fillRef idx="2">
+            <a:schemeClr val="accent1"/>
+          </a:fillRef>
+          <a:effectRef idx="1">
+            <a:schemeClr val="accent1"/>
+          </a:effectRef>
+          <a:fontRef idx="minor">
+            <a:schemeClr val="dk1"/>
+          </a:fontRef>
+        </p:style>
+        <p:txBody>
+          <a:bodyPr wrap="square" rtlCol="0">
+            <a:spAutoFit/>
+          </a:bodyPr>
+          <a:lstStyle/>
+          <a:p>
+            <a:pPr algn="ctr"/>
+            <a:r>
+              <a:rPr lang="en-GB" dirty="0"/>
+              <a:t>Data hasn’t been added for this check. Do nothing.</a:t>
+            </a:r>
+          </a:p>
+        </p:txBody>
+      </p:sp>
+      <p:sp>
+        <p:nvSpPr>
+          <p:cNvPr id="25" name="TextBox 24">
+            <a:extLst>
+              <a:ext uri="{FF2B5EF4-FFF2-40B4-BE49-F238E27FC236}">
+                <a16:creationId xmlns:a16="http://schemas.microsoft.com/office/drawing/2014/main" id="{E16BBE8D-72AC-49BB-91DA-B8E16F538BC3}"/>
+              </a:ext>
+            </a:extLst>
+          </p:cNvPr>
+          <p:cNvSpPr txBox="1"/>
+          <p:nvPr/>
+        </p:nvSpPr>
+        <p:spPr>
+          <a:xfrm>
+            <a:off x="5886049" y="3746592"/>
+            <a:ext cx="2009541" cy="2308324"/>
+          </a:xfrm>
+          <a:prstGeom prst="rect">
+            <a:avLst/>
+          </a:prstGeom>
+          <a:solidFill>
+            <a:schemeClr val="accent6">
+              <a:lumMod val="20000"/>
+              <a:lumOff val="80000"/>
+            </a:schemeClr>
+          </a:solidFill>
+        </p:spPr>
+        <p:style>
+          <a:lnRef idx="1">
+            <a:schemeClr val="accent1"/>
+          </a:lnRef>
+          <a:fillRef idx="2">
+            <a:schemeClr val="accent1"/>
+          </a:fillRef>
+          <a:effectRef idx="1">
+            <a:schemeClr val="accent1"/>
+          </a:effectRef>
+          <a:fontRef idx="minor">
+            <a:schemeClr val="dk1"/>
+          </a:fontRef>
+        </p:style>
+        <p:txBody>
+          <a:bodyPr wrap="square" rtlCol="0">
+            <a:spAutoFit/>
+          </a:bodyPr>
+          <a:lstStyle/>
+          <a:p>
+            <a:pPr algn="ctr"/>
+            <a:r>
+              <a:rPr lang="en-GB" dirty="0"/>
+              <a:t>App data has been updated.</a:t>
+            </a:r>
+          </a:p>
+          <a:p>
+            <a:pPr algn="ctr"/>
+            <a:r>
+              <a:rPr lang="en-GB" dirty="0"/>
+              <a:t>Copy data from SQL to SCD database.</a:t>
+            </a:r>
+          </a:p>
+          <a:p>
+            <a:pPr algn="ctr"/>
+            <a:r>
+              <a:rPr lang="en-GB" dirty="0"/>
+              <a:t>Overwrite data in SQL with current app data.</a:t>
+            </a:r>
+          </a:p>
+        </p:txBody>
+      </p:sp>
+      <p:cxnSp>
+        <p:nvCxnSpPr>
+          <p:cNvPr id="26" name="Straight Arrow Connector 25">
+            <a:extLst>
+              <a:ext uri="{FF2B5EF4-FFF2-40B4-BE49-F238E27FC236}">
+                <a16:creationId xmlns:a16="http://schemas.microsoft.com/office/drawing/2014/main" id="{D242B8A7-2309-48D6-988B-2EB44521B55D}"/>
+              </a:ext>
+            </a:extLst>
+          </p:cNvPr>
+          <p:cNvCxnSpPr>
+            <a:cxnSpLocks/>
+          </p:cNvCxnSpPr>
+          <p:nvPr/>
+        </p:nvCxnSpPr>
+        <p:spPr>
+          <a:xfrm>
+            <a:off x="6890820" y="3139921"/>
+            <a:ext cx="0" cy="578159"/>
+          </a:xfrm>
+          <a:prstGeom prst="straightConnector1">
+            <a:avLst/>
+          </a:prstGeom>
+          <a:ln>
+            <a:tailEnd type="triangle"/>
+          </a:ln>
+        </p:spPr>
+        <p:style>
+          <a:lnRef idx="1">
+            <a:schemeClr val="accent1"/>
+          </a:lnRef>
+          <a:fillRef idx="0">
+            <a:schemeClr val="accent1"/>
+          </a:fillRef>
+          <a:effectRef idx="0">
+            <a:schemeClr val="accent1"/>
+          </a:effectRef>
+          <a:fontRef idx="minor">
+            <a:schemeClr val="tx1"/>
+          </a:fontRef>
+        </p:style>
+      </p:cxnSp>
+      <p:sp>
+        <p:nvSpPr>
+          <p:cNvPr id="28" name="TextBox 27">
+            <a:extLst>
+              <a:ext uri="{FF2B5EF4-FFF2-40B4-BE49-F238E27FC236}">
+                <a16:creationId xmlns:a16="http://schemas.microsoft.com/office/drawing/2014/main" id="{3FED96C2-2763-4B4E-9FC8-DAC57BD59C74}"/>
+              </a:ext>
+            </a:extLst>
+          </p:cNvPr>
+          <p:cNvSpPr txBox="1"/>
+          <p:nvPr/>
+        </p:nvSpPr>
+        <p:spPr>
+          <a:xfrm>
+            <a:off x="6890819" y="3225611"/>
+            <a:ext cx="455574" cy="369332"/>
+          </a:xfrm>
+          <a:prstGeom prst="rect">
+            <a:avLst/>
+          </a:prstGeom>
+          <a:noFill/>
+        </p:spPr>
+        <p:txBody>
+          <a:bodyPr wrap="none" rtlCol="0">
+            <a:spAutoFit/>
+          </a:bodyPr>
+          <a:lstStyle/>
+          <a:p>
+            <a:r>
+              <a:rPr lang="en-GB" dirty="0"/>
+              <a:t>No</a:t>
+            </a:r>
+          </a:p>
+        </p:txBody>
+      </p:sp>
+      <p:cxnSp>
+        <p:nvCxnSpPr>
+          <p:cNvPr id="29" name="Straight Arrow Connector 28">
+            <a:extLst>
+              <a:ext uri="{FF2B5EF4-FFF2-40B4-BE49-F238E27FC236}">
+                <a16:creationId xmlns:a16="http://schemas.microsoft.com/office/drawing/2014/main" id="{D7AF10CB-732D-4E41-AD04-B80E5F96C349}"/>
+              </a:ext>
+            </a:extLst>
+          </p:cNvPr>
+          <p:cNvCxnSpPr>
+            <a:cxnSpLocks/>
+          </p:cNvCxnSpPr>
+          <p:nvPr/>
+        </p:nvCxnSpPr>
+        <p:spPr>
+          <a:xfrm flipV="1">
+            <a:off x="7772645" y="2789792"/>
+            <a:ext cx="753046" cy="1"/>
+          </a:xfrm>
+          <a:prstGeom prst="straightConnector1">
+            <a:avLst/>
+          </a:prstGeom>
+          <a:ln>
+            <a:tailEnd type="triangle"/>
+          </a:ln>
+        </p:spPr>
+        <p:style>
+          <a:lnRef idx="1">
+            <a:schemeClr val="accent1"/>
+          </a:lnRef>
+          <a:fillRef idx="0">
+            <a:schemeClr val="accent1"/>
+          </a:fillRef>
+          <a:effectRef idx="0">
+            <a:schemeClr val="accent1"/>
+          </a:effectRef>
+          <a:fontRef idx="minor">
+            <a:schemeClr val="tx1"/>
+          </a:fontRef>
+        </p:style>
+      </p:cxnSp>
+      <p:sp>
+        <p:nvSpPr>
+          <p:cNvPr id="32" name="TextBox 31">
+            <a:extLst>
+              <a:ext uri="{FF2B5EF4-FFF2-40B4-BE49-F238E27FC236}">
+                <a16:creationId xmlns:a16="http://schemas.microsoft.com/office/drawing/2014/main" id="{0224A9E8-4EE4-4100-8E5A-6974A38299F5}"/>
+              </a:ext>
+            </a:extLst>
+          </p:cNvPr>
+          <p:cNvSpPr txBox="1"/>
+          <p:nvPr/>
+        </p:nvSpPr>
+        <p:spPr>
+          <a:xfrm>
+            <a:off x="8525691" y="2466626"/>
+            <a:ext cx="2009541" cy="923330"/>
+          </a:xfrm>
+          <a:prstGeom prst="rect">
+            <a:avLst/>
+          </a:prstGeom>
+          <a:solidFill>
+            <a:schemeClr val="accent2">
+              <a:lumMod val="40000"/>
+              <a:lumOff val="60000"/>
+            </a:schemeClr>
+          </a:solidFill>
+        </p:spPr>
+        <p:style>
+          <a:lnRef idx="1">
+            <a:schemeClr val="accent1"/>
+          </a:lnRef>
+          <a:fillRef idx="2">
+            <a:schemeClr val="accent1"/>
+          </a:fillRef>
+          <a:effectRef idx="1">
+            <a:schemeClr val="accent1"/>
+          </a:effectRef>
+          <a:fontRef idx="minor">
+            <a:schemeClr val="dk1"/>
+          </a:fontRef>
+        </p:style>
+        <p:txBody>
+          <a:bodyPr wrap="square" rtlCol="0">
+            <a:spAutoFit/>
+          </a:bodyPr>
+          <a:lstStyle/>
+          <a:p>
+            <a:pPr algn="ctr"/>
+            <a:r>
+              <a:rPr lang="en-GB" dirty="0"/>
+              <a:t>Data hasn’t been updated. Do nothing.</a:t>
+            </a:r>
+          </a:p>
+        </p:txBody>
+      </p:sp>
+      <p:sp>
+        <p:nvSpPr>
+          <p:cNvPr id="33" name="TextBox 32">
+            <a:extLst>
+              <a:ext uri="{FF2B5EF4-FFF2-40B4-BE49-F238E27FC236}">
+                <a16:creationId xmlns:a16="http://schemas.microsoft.com/office/drawing/2014/main" id="{A7F0BA27-FD36-4186-B4B2-0690E52D298F}"/>
+              </a:ext>
+            </a:extLst>
+          </p:cNvPr>
+          <p:cNvSpPr txBox="1"/>
+          <p:nvPr/>
+        </p:nvSpPr>
+        <p:spPr>
+          <a:xfrm>
+            <a:off x="7926251" y="2464003"/>
+            <a:ext cx="485518" cy="369332"/>
+          </a:xfrm>
+          <a:prstGeom prst="rect">
+            <a:avLst/>
+          </a:prstGeom>
+          <a:noFill/>
+        </p:spPr>
+        <p:txBody>
+          <a:bodyPr wrap="none" rtlCol="0">
+            <a:spAutoFit/>
+          </a:bodyPr>
+          <a:lstStyle/>
+          <a:p>
+            <a:r>
+              <a:rPr lang="en-GB" dirty="0"/>
+              <a:t>Yes</a:t>
+            </a:r>
+          </a:p>
+        </p:txBody>
+      </p:sp>
+    </p:spTree>
+    <p:extLst>
+      <p:ext uri="{BB962C8B-B14F-4D97-AF65-F5344CB8AC3E}">
+        <p14:creationId xmlns:p14="http://schemas.microsoft.com/office/powerpoint/2010/main" val="2423129868"/>
       </p:ext>
     </p:extLst>
   </p:cSld>

</xml_diff>

<commit_message>
Adding SCD for dbo.QA_log
</commit_message>
<xml_diff>
--- a/QA log app - behind the code.pptx
+++ b/QA log app - behind the code.pptx
@@ -142,7 +142,7 @@
   <pc:docChgLst>
     <pc:chgData name="MORLEY, Thomas" userId="ca0a1631-feee-46f8-9dc6-a0f397eff84f" providerId="ADAL" clId="{E34FB9E7-6CF7-40FD-83B9-B94EF404FC33}"/>
     <pc:docChg chg="undo redo custSel addSld delSld modSld">
-      <pc:chgData name="MORLEY, Thomas" userId="ca0a1631-feee-46f8-9dc6-a0f397eff84f" providerId="ADAL" clId="{E34FB9E7-6CF7-40FD-83B9-B94EF404FC33}" dt="2021-11-05T10:42:24.627" v="6780" actId="20577"/>
+      <pc:chgData name="MORLEY, Thomas" userId="ca0a1631-feee-46f8-9dc6-a0f397eff84f" providerId="ADAL" clId="{E34FB9E7-6CF7-40FD-83B9-B94EF404FC33}" dt="2021-11-05T10:50:03.393" v="6838" actId="1076"/>
       <pc:docMkLst>
         <pc:docMk/>
       </pc:docMkLst>
@@ -1002,7 +1002,7 @@
         </pc:cxnChg>
       </pc:sldChg>
       <pc:sldChg chg="addSp modSp new mod">
-        <pc:chgData name="MORLEY, Thomas" userId="ca0a1631-feee-46f8-9dc6-a0f397eff84f" providerId="ADAL" clId="{E34FB9E7-6CF7-40FD-83B9-B94EF404FC33}" dt="2021-11-02T15:28:22.966" v="3310" actId="207"/>
+        <pc:chgData name="MORLEY, Thomas" userId="ca0a1631-feee-46f8-9dc6-a0f397eff84f" providerId="ADAL" clId="{E34FB9E7-6CF7-40FD-83B9-B94EF404FC33}" dt="2021-11-05T10:50:03.393" v="6838" actId="1076"/>
         <pc:sldMkLst>
           <pc:docMk/>
           <pc:sldMk cId="2423129868" sldId="266"/>
@@ -1056,7 +1056,7 @@
           </ac:spMkLst>
         </pc:spChg>
         <pc:spChg chg="add mod">
-          <ac:chgData name="MORLEY, Thomas" userId="ca0a1631-feee-46f8-9dc6-a0f397eff84f" providerId="ADAL" clId="{E34FB9E7-6CF7-40FD-83B9-B94EF404FC33}" dt="2021-11-02T15:28:11.494" v="3307" actId="207"/>
+          <ac:chgData name="MORLEY, Thomas" userId="ca0a1631-feee-46f8-9dc6-a0f397eff84f" providerId="ADAL" clId="{E34FB9E7-6CF7-40FD-83B9-B94EF404FC33}" dt="2021-11-05T10:50:03.393" v="6838" actId="1076"/>
           <ac:spMkLst>
             <pc:docMk/>
             <pc:sldMk cId="2423129868" sldId="266"/>
@@ -14510,8 +14510,8 @@
         </p:nvSpPr>
         <p:spPr>
           <a:xfrm>
-            <a:off x="1075508" y="5434149"/>
-            <a:ext cx="3219023" cy="646331"/>
+            <a:off x="810780" y="5434149"/>
+            <a:ext cx="4918782" cy="923330"/>
           </a:xfrm>
           <a:prstGeom prst="rect">
             <a:avLst/>
@@ -14552,6 +14552,12 @@
             <a:r>
               <a:rPr lang="en-GB" dirty="0"/>
               <a:t>Add a new row to SQL database.</a:t>
+            </a:r>
+          </a:p>
+          <a:p>
+            <a:r>
+              <a:rPr lang="en-GB" dirty="0"/>
+              <a:t>Add a row to SCD database with “TO BE CHECKED”</a:t>
             </a:r>
           </a:p>
         </p:txBody>

</xml_diff>